<commit_message>
Làm slide 5 & 6
Đinh Hưng Thịnh CD17TT7
</commit_message>
<xml_diff>
--- a/dh.pptx
+++ b/dh.pptx
@@ -12,9 +12,9 @@
     <p:sldId id="275" r:id="rId3"/>
     <p:sldId id="266" r:id="rId4"/>
     <p:sldId id="276" r:id="rId5"/>
-    <p:sldId id="277" r:id="rId6"/>
-    <p:sldId id="278" r:id="rId7"/>
-    <p:sldId id="279" r:id="rId8"/>
+    <p:sldId id="278" r:id="rId6"/>
+    <p:sldId id="279" r:id="rId7"/>
+    <p:sldId id="277" r:id="rId8"/>
     <p:sldId id="281" r:id="rId9"/>
     <p:sldId id="282" r:id="rId10"/>
     <p:sldId id="283" r:id="rId11"/>
@@ -116,6 +116,22 @@
       </a:defRPr>
     </a:lvl9pPr>
   </p:defaultTextStyle>
+  <p:extLst>
+    <p:ext uri="{EFAFB233-063F-42B5-8137-9DF3F51BA10A}">
+      <p15:sldGuideLst xmlns:p15="http://schemas.microsoft.com/office/powerpoint/2012/main">
+        <p15:guide id="1" orient="horz" pos="2160">
+          <p15:clr>
+            <a:srgbClr val="A4A3A4"/>
+          </p15:clr>
+        </p15:guide>
+        <p15:guide id="2" pos="2880">
+          <p15:clr>
+            <a:srgbClr val="A4A3A4"/>
+          </p15:clr>
+        </p15:guide>
+      </p15:sldGuideLst>
+    </p:ext>
+  </p:extLst>
 </p:presentation>
 </file>
 
@@ -201,7 +217,7 @@
           <a:p>
             <a:fld id="{2783738E-ECF3-4053-90BB-2CFDB20A884A}" type="datetimeFigureOut">
               <a:rPr lang="en-US" smtClean="0"/>
-              <a:t>11/28/2017</a:t>
+              <a:t>17/12/04</a:t>
             </a:fld>
             <a:endParaRPr lang="en-US"/>
           </a:p>
@@ -2281,7 +2297,7 @@
           <a:p>
             <a:fld id="{E02F7577-C9CA-4F28-A0F7-189332EEE261}" type="datetime1">
               <a:rPr lang="en-US" smtClean="0"/>
-              <a:t>11/28/2017</a:t>
+              <a:t>17/12/04</a:t>
             </a:fld>
             <a:endParaRPr lang="en-US"/>
           </a:p>
@@ -2466,7 +2482,7 @@
           <a:p>
             <a:fld id="{84BE5362-53E7-4D64-90A2-6370225B5327}" type="datetime1">
               <a:rPr lang="en-US" smtClean="0"/>
-              <a:t>11/28/2017</a:t>
+              <a:t>17/12/04</a:t>
             </a:fld>
             <a:endParaRPr lang="en-US"/>
           </a:p>
@@ -2621,7 +2637,7 @@
           <a:p>
             <a:fld id="{1BBE4936-7588-4BB1-AF97-3A91711B5EE5}" type="datetime1">
               <a:rPr lang="en-US" smtClean="0"/>
-              <a:t>11/28/2017</a:t>
+              <a:t>17/12/04</a:t>
             </a:fld>
             <a:endParaRPr lang="en-US"/>
           </a:p>
@@ -6340,7 +6356,7 @@
           <a:p>
             <a:fld id="{99EEF9DB-ABE7-4626-8E3C-FBCD4639E1A7}" type="datetime1">
               <a:rPr lang="en-US" smtClean="0"/>
-              <a:t>11/28/2017</a:t>
+              <a:t>17/12/04</a:t>
             </a:fld>
             <a:endParaRPr lang="en-US"/>
           </a:p>
@@ -6457,7 +6473,7 @@
           <a:p>
             <a:fld id="{EC017455-01E4-43CF-9904-0D9AEF083FD2}" type="datetime1">
               <a:rPr lang="en-US" smtClean="0"/>
-              <a:t>11/28/2017</a:t>
+              <a:t>17/12/04</a:t>
             </a:fld>
             <a:endParaRPr lang="en-US"/>
           </a:p>
@@ -7002,7 +7018,7 @@
           <a:p>
             <a:fld id="{0BC4FAF3-0654-419F-8FF5-57AA1BAE8AAD}" type="datetime1">
               <a:rPr lang="en-US" smtClean="0"/>
-              <a:t>11/28/2017</a:t>
+              <a:t>17/12/04</a:t>
             </a:fld>
             <a:endParaRPr lang="en-US"/>
           </a:p>
@@ -7119,7 +7135,7 @@
           <a:p>
             <a:fld id="{80CFF5DB-7FE0-4234-B0E8-95CD1AE7DB30}" type="datetime1">
               <a:rPr lang="en-US" smtClean="0"/>
-              <a:t>11/28/2017</a:t>
+              <a:t>17/12/04</a:t>
             </a:fld>
             <a:endParaRPr lang="en-US"/>
           </a:p>
@@ -8834,7 +8850,7 @@
           <a:p>
             <a:fld id="{15D4BCAE-8BBB-46EC-B65E-CC60048D2CB1}" type="datetime1">
               <a:rPr lang="en-US" smtClean="0"/>
-              <a:t>11/28/2017</a:t>
+              <a:t>17/12/04</a:t>
             </a:fld>
             <a:endParaRPr lang="en-US"/>
           </a:p>
@@ -8989,7 +9005,7 @@
           <a:p>
             <a:fld id="{1D9F27DB-86C5-4247-9427-30A24D67CE88}" type="datetime1">
               <a:rPr lang="en-US" smtClean="0"/>
-              <a:t>11/28/2017</a:t>
+              <a:t>17/12/04</a:t>
             </a:fld>
             <a:endParaRPr lang="en-US"/>
           </a:p>
@@ -12608,7 +12624,7 @@
           <a:p>
             <a:fld id="{9A9891D2-FB49-4729-8ADE-9BA37BA3DF58}" type="datetime1">
               <a:rPr lang="en-US" smtClean="0"/>
-              <a:t>11/28/2017</a:t>
+              <a:t>17/12/04</a:t>
             </a:fld>
             <a:endParaRPr lang="en-US"/>
           </a:p>
@@ -14471,7 +14487,7 @@
           <a:p>
             <a:fld id="{26D1DDB1-ACE6-4527-930D-52278B6D2D2C}" type="datetime1">
               <a:rPr lang="en-US" smtClean="0"/>
-              <a:t>11/28/2017</a:t>
+              <a:t>17/12/04</a:t>
             </a:fld>
             <a:endParaRPr lang="en-US"/>
           </a:p>
@@ -16032,45 +16048,639 @@
         </p:nvSpPr>
         <p:spPr>
           <a:xfrm>
-            <a:off x="872067" y="533400"/>
-            <a:ext cx="7408333" cy="5592763"/>
+            <a:off x="685801" y="533400"/>
+            <a:ext cx="7594600" cy="5592763"/>
           </a:xfrm>
         </p:spPr>
         <p:txBody>
-          <a:bodyPr/>
+          <a:bodyPr>
+            <a:normAutofit/>
+          </a:bodyPr>
           <a:lstStyle/>
           <a:p>
             <a:r>
-              <a:rPr lang="en-US" sz="2000" b="1" dirty="0" err="1">
+              <a:rPr lang="en-US" sz="3200" b="1" dirty="0" err="1" smtClean="0">
                 <a:latin typeface="Times New Roman" pitchFamily="18" charset="0"/>
                 <a:cs typeface="Times New Roman" pitchFamily="18" charset="0"/>
               </a:rPr>
-              <a:t>Hậu</a:t>
-            </a:r>
-            <a:r>
-              <a:rPr lang="en-US" sz="2000" b="1" dirty="0">
+              <a:t>Kịch</a:t>
+            </a:r>
+            <a:r>
+              <a:rPr lang="en-US" sz="3200" b="1" dirty="0" smtClean="0">
                 <a:latin typeface="Times New Roman" pitchFamily="18" charset="0"/>
                 <a:cs typeface="Times New Roman" pitchFamily="18" charset="0"/>
               </a:rPr>
               <a:t> </a:t>
             </a:r>
             <a:r>
-              <a:rPr lang="en-US" sz="2000" b="1" dirty="0" err="1">
+              <a:rPr lang="en-US" sz="3200" b="1" dirty="0" err="1" smtClean="0">
                 <a:latin typeface="Times New Roman" pitchFamily="18" charset="0"/>
                 <a:cs typeface="Times New Roman" pitchFamily="18" charset="0"/>
               </a:rPr>
-              <a:t>kì</a:t>
-            </a:r>
-            <a:r>
-              <a:rPr lang="en-US" sz="2000" b="1" dirty="0">
+              <a:t>bản</a:t>
+            </a:r>
+            <a:r>
+              <a:rPr lang="en-US" sz="3200" b="1" dirty="0" smtClean="0">
                 <a:latin typeface="Times New Roman" pitchFamily="18" charset="0"/>
                 <a:cs typeface="Times New Roman" pitchFamily="18" charset="0"/>
               </a:rPr>
-              <a:t>:</a:t>
+              <a:t> “</a:t>
+            </a:r>
+            <a:r>
+              <a:rPr lang="en-US" sz="3200" b="1" dirty="0" err="1" smtClean="0">
+                <a:latin typeface="Times New Roman" pitchFamily="18" charset="0"/>
+                <a:cs typeface="Times New Roman" pitchFamily="18" charset="0"/>
+              </a:rPr>
+              <a:t>Ước</a:t>
+            </a:r>
+            <a:r>
+              <a:rPr lang="en-US" sz="3200" b="1" dirty="0" smtClean="0">
+                <a:latin typeface="Times New Roman" pitchFamily="18" charset="0"/>
+                <a:cs typeface="Times New Roman" pitchFamily="18" charset="0"/>
+              </a:rPr>
+              <a:t> </a:t>
+            </a:r>
+            <a:r>
+              <a:rPr lang="en-US" sz="3200" b="1" dirty="0" err="1" smtClean="0">
+                <a:latin typeface="Times New Roman" pitchFamily="18" charset="0"/>
+                <a:cs typeface="Times New Roman" pitchFamily="18" charset="0"/>
+              </a:rPr>
+              <a:t>mơ</a:t>
+            </a:r>
+            <a:r>
+              <a:rPr lang="en-US" sz="3200" b="1" dirty="0" smtClean="0">
+                <a:latin typeface="Times New Roman" pitchFamily="18" charset="0"/>
+                <a:cs typeface="Times New Roman" pitchFamily="18" charset="0"/>
+              </a:rPr>
+              <a:t> </a:t>
+            </a:r>
+            <a:r>
+              <a:rPr lang="en-US" sz="3200" b="1" dirty="0" err="1" smtClean="0">
+                <a:latin typeface="Times New Roman" pitchFamily="18" charset="0"/>
+                <a:cs typeface="Times New Roman" pitchFamily="18" charset="0"/>
+              </a:rPr>
+              <a:t>đầu</a:t>
+            </a:r>
+            <a:r>
+              <a:rPr lang="en-US" sz="3200" b="1" dirty="0" smtClean="0">
+                <a:latin typeface="Times New Roman" pitchFamily="18" charset="0"/>
+                <a:cs typeface="Times New Roman" pitchFamily="18" charset="0"/>
+              </a:rPr>
+              <a:t> </a:t>
+            </a:r>
+            <a:r>
+              <a:rPr lang="en-US" sz="3200" b="1" dirty="0" err="1" smtClean="0">
+                <a:latin typeface="Times New Roman" pitchFamily="18" charset="0"/>
+                <a:cs typeface="Times New Roman" pitchFamily="18" charset="0"/>
+              </a:rPr>
+              <a:t>đời</a:t>
+            </a:r>
+            <a:r>
+              <a:rPr lang="en-US" sz="3200" b="1" dirty="0" smtClean="0">
+                <a:latin typeface="Times New Roman" pitchFamily="18" charset="0"/>
+                <a:cs typeface="Times New Roman" pitchFamily="18" charset="0"/>
+              </a:rPr>
+              <a:t>”</a:t>
             </a:r>
           </a:p>
           <a:p>
-            <a:endParaRPr lang="en-US" dirty="0"/>
+            <a:r>
+              <a:rPr lang="en-US" sz="3200" b="1" dirty="0" err="1" smtClean="0">
+                <a:latin typeface="Times New Roman" pitchFamily="18" charset="0"/>
+                <a:cs typeface="Times New Roman" pitchFamily="18" charset="0"/>
+              </a:rPr>
+              <a:t>Nội</a:t>
+            </a:r>
+            <a:r>
+              <a:rPr lang="en-US" sz="3200" b="1" dirty="0" smtClean="0">
+                <a:latin typeface="Times New Roman" pitchFamily="18" charset="0"/>
+                <a:cs typeface="Times New Roman" pitchFamily="18" charset="0"/>
+              </a:rPr>
+              <a:t> dung:</a:t>
+            </a:r>
+            <a:br>
+              <a:rPr lang="en-US" sz="3200" b="1" dirty="0" smtClean="0">
+                <a:latin typeface="Times New Roman" pitchFamily="18" charset="0"/>
+                <a:cs typeface="Times New Roman" pitchFamily="18" charset="0"/>
+              </a:rPr>
+            </a:br>
+            <a:r>
+              <a:rPr lang="en-US" sz="3200" dirty="0" err="1" smtClean="0">
+                <a:latin typeface="Times New Roman" pitchFamily="18" charset="0"/>
+                <a:cs typeface="Times New Roman" pitchFamily="18" charset="0"/>
+              </a:rPr>
+              <a:t>Kể</a:t>
+            </a:r>
+            <a:r>
+              <a:rPr lang="en-US" sz="3200" dirty="0" smtClean="0">
+                <a:latin typeface="Times New Roman" pitchFamily="18" charset="0"/>
+                <a:cs typeface="Times New Roman" pitchFamily="18" charset="0"/>
+              </a:rPr>
+              <a:t> </a:t>
+            </a:r>
+            <a:r>
+              <a:rPr lang="en-US" sz="3200" dirty="0" err="1" smtClean="0">
+                <a:latin typeface="Times New Roman" pitchFamily="18" charset="0"/>
+                <a:cs typeface="Times New Roman" pitchFamily="18" charset="0"/>
+              </a:rPr>
+              <a:t>về</a:t>
+            </a:r>
+            <a:r>
+              <a:rPr lang="en-US" sz="3200" dirty="0" smtClean="0">
+                <a:latin typeface="Times New Roman" pitchFamily="18" charset="0"/>
+                <a:cs typeface="Times New Roman" pitchFamily="18" charset="0"/>
+              </a:rPr>
+              <a:t> </a:t>
+            </a:r>
+            <a:r>
+              <a:rPr lang="en-US" sz="3200" dirty="0" err="1" smtClean="0">
+                <a:latin typeface="Times New Roman" pitchFamily="18" charset="0"/>
+                <a:cs typeface="Times New Roman" pitchFamily="18" charset="0"/>
+              </a:rPr>
+              <a:t>ước</a:t>
+            </a:r>
+            <a:r>
+              <a:rPr lang="en-US" sz="3200" dirty="0" smtClean="0">
+                <a:latin typeface="Times New Roman" pitchFamily="18" charset="0"/>
+                <a:cs typeface="Times New Roman" pitchFamily="18" charset="0"/>
+              </a:rPr>
+              <a:t> </a:t>
+            </a:r>
+            <a:r>
+              <a:rPr lang="en-US" sz="3200" dirty="0" err="1" smtClean="0">
+                <a:latin typeface="Times New Roman" pitchFamily="18" charset="0"/>
+                <a:cs typeface="Times New Roman" pitchFamily="18" charset="0"/>
+              </a:rPr>
+              <a:t>mơ</a:t>
+            </a:r>
+            <a:r>
+              <a:rPr lang="en-US" sz="3200" dirty="0" smtClean="0">
+                <a:latin typeface="Times New Roman" pitchFamily="18" charset="0"/>
+                <a:cs typeface="Times New Roman" pitchFamily="18" charset="0"/>
+              </a:rPr>
+              <a:t> </a:t>
+            </a:r>
+            <a:r>
+              <a:rPr lang="en-US" sz="3200" dirty="0" err="1" smtClean="0">
+                <a:latin typeface="Times New Roman" pitchFamily="18" charset="0"/>
+                <a:cs typeface="Times New Roman" pitchFamily="18" charset="0"/>
+              </a:rPr>
+              <a:t>của</a:t>
+            </a:r>
+            <a:r>
+              <a:rPr lang="en-US" sz="3200" dirty="0" smtClean="0">
+                <a:latin typeface="Times New Roman" pitchFamily="18" charset="0"/>
+                <a:cs typeface="Times New Roman" pitchFamily="18" charset="0"/>
+              </a:rPr>
+              <a:t> </a:t>
+            </a:r>
+            <a:r>
+              <a:rPr lang="en-US" sz="3200" dirty="0" err="1" smtClean="0">
+                <a:latin typeface="Times New Roman" pitchFamily="18" charset="0"/>
+                <a:cs typeface="Times New Roman" pitchFamily="18" charset="0"/>
+              </a:rPr>
+              <a:t>một</a:t>
+            </a:r>
+            <a:r>
+              <a:rPr lang="en-US" sz="3200" dirty="0" smtClean="0">
+                <a:latin typeface="Times New Roman" pitchFamily="18" charset="0"/>
+                <a:cs typeface="Times New Roman" pitchFamily="18" charset="0"/>
+              </a:rPr>
+              <a:t> </a:t>
+            </a:r>
+            <a:r>
+              <a:rPr lang="en-US" sz="3200" dirty="0" err="1" smtClean="0">
+                <a:latin typeface="Times New Roman" pitchFamily="18" charset="0"/>
+                <a:cs typeface="Times New Roman" pitchFamily="18" charset="0"/>
+              </a:rPr>
+              <a:t>học</a:t>
+            </a:r>
+            <a:r>
+              <a:rPr lang="en-US" sz="3200" dirty="0" smtClean="0">
+                <a:latin typeface="Times New Roman" pitchFamily="18" charset="0"/>
+                <a:cs typeface="Times New Roman" pitchFamily="18" charset="0"/>
+              </a:rPr>
+              <a:t> </a:t>
+            </a:r>
+            <a:r>
+              <a:rPr lang="en-US" sz="3200" dirty="0" err="1" smtClean="0">
+                <a:latin typeface="Times New Roman" pitchFamily="18" charset="0"/>
+                <a:cs typeface="Times New Roman" pitchFamily="18" charset="0"/>
+              </a:rPr>
+              <a:t>sinh</a:t>
+            </a:r>
+            <a:r>
+              <a:rPr lang="en-US" sz="3200" dirty="0" smtClean="0">
+                <a:latin typeface="Times New Roman" pitchFamily="18" charset="0"/>
+                <a:cs typeface="Times New Roman" pitchFamily="18" charset="0"/>
+              </a:rPr>
+              <a:t> </a:t>
+            </a:r>
+            <a:r>
+              <a:rPr lang="en-US" sz="3200" dirty="0" err="1" smtClean="0">
+                <a:latin typeface="Times New Roman" pitchFamily="18" charset="0"/>
+                <a:cs typeface="Times New Roman" pitchFamily="18" charset="0"/>
+              </a:rPr>
+              <a:t>tên</a:t>
+            </a:r>
+            <a:r>
+              <a:rPr lang="en-US" sz="3200" dirty="0" smtClean="0">
+                <a:latin typeface="Times New Roman" pitchFamily="18" charset="0"/>
+                <a:cs typeface="Times New Roman" pitchFamily="18" charset="0"/>
+              </a:rPr>
+              <a:t> </a:t>
+            </a:r>
+            <a:r>
+              <a:rPr lang="en-US" sz="3200" dirty="0" err="1" smtClean="0">
+                <a:latin typeface="Times New Roman" pitchFamily="18" charset="0"/>
+                <a:cs typeface="Times New Roman" pitchFamily="18" charset="0"/>
+              </a:rPr>
+              <a:t>Thái</a:t>
+            </a:r>
+            <a:r>
+              <a:rPr lang="en-US" sz="3200" dirty="0" smtClean="0">
+                <a:latin typeface="Times New Roman" pitchFamily="18" charset="0"/>
+                <a:cs typeface="Times New Roman" pitchFamily="18" charset="0"/>
+              </a:rPr>
+              <a:t> </a:t>
+            </a:r>
+            <a:r>
+              <a:rPr lang="en-US" sz="3200" dirty="0" err="1" smtClean="0">
+                <a:latin typeface="Times New Roman" pitchFamily="18" charset="0"/>
+                <a:cs typeface="Times New Roman" pitchFamily="18" charset="0"/>
+              </a:rPr>
+              <a:t>khi</a:t>
+            </a:r>
+            <a:r>
+              <a:rPr lang="en-US" sz="3200" dirty="0" smtClean="0">
+                <a:latin typeface="Times New Roman" pitchFamily="18" charset="0"/>
+                <a:cs typeface="Times New Roman" pitchFamily="18" charset="0"/>
+              </a:rPr>
+              <a:t> </a:t>
+            </a:r>
+            <a:r>
+              <a:rPr lang="en-US" sz="3200" dirty="0" err="1" smtClean="0">
+                <a:latin typeface="Times New Roman" pitchFamily="18" charset="0"/>
+                <a:cs typeface="Times New Roman" pitchFamily="18" charset="0"/>
+              </a:rPr>
+              <a:t>vô</a:t>
+            </a:r>
+            <a:r>
+              <a:rPr lang="en-US" sz="3200" dirty="0" smtClean="0">
+                <a:latin typeface="Times New Roman" pitchFamily="18" charset="0"/>
+                <a:cs typeface="Times New Roman" pitchFamily="18" charset="0"/>
+              </a:rPr>
+              <a:t> </a:t>
+            </a:r>
+            <a:r>
+              <a:rPr lang="en-US" sz="3200" dirty="0" err="1" smtClean="0">
+                <a:latin typeface="Times New Roman" pitchFamily="18" charset="0"/>
+                <a:cs typeface="Times New Roman" pitchFamily="18" charset="0"/>
+              </a:rPr>
+              <a:t>tình</a:t>
+            </a:r>
+            <a:r>
+              <a:rPr lang="en-US" sz="3200" dirty="0" smtClean="0">
+                <a:latin typeface="Times New Roman" pitchFamily="18" charset="0"/>
+                <a:cs typeface="Times New Roman" pitchFamily="18" charset="0"/>
+              </a:rPr>
+              <a:t> </a:t>
+            </a:r>
+            <a:r>
+              <a:rPr lang="en-US" sz="3200" dirty="0" err="1" smtClean="0">
+                <a:latin typeface="Times New Roman" pitchFamily="18" charset="0"/>
+                <a:cs typeface="Times New Roman" pitchFamily="18" charset="0"/>
+              </a:rPr>
+              <a:t>xem</a:t>
+            </a:r>
+            <a:r>
+              <a:rPr lang="en-US" sz="3200" dirty="0" smtClean="0">
+                <a:latin typeface="Times New Roman" pitchFamily="18" charset="0"/>
+                <a:cs typeface="Times New Roman" pitchFamily="18" charset="0"/>
+              </a:rPr>
+              <a:t> </a:t>
+            </a:r>
+            <a:r>
+              <a:rPr lang="en-US" sz="3200" dirty="0" err="1" smtClean="0">
+                <a:latin typeface="Times New Roman" pitchFamily="18" charset="0"/>
+                <a:cs typeface="Times New Roman" pitchFamily="18" charset="0"/>
+              </a:rPr>
+              <a:t>được</a:t>
+            </a:r>
+            <a:r>
+              <a:rPr lang="en-US" sz="3200" dirty="0" smtClean="0">
+                <a:latin typeface="Times New Roman" pitchFamily="18" charset="0"/>
+                <a:cs typeface="Times New Roman" pitchFamily="18" charset="0"/>
+              </a:rPr>
+              <a:t> </a:t>
+            </a:r>
+            <a:r>
+              <a:rPr lang="en-US" sz="3200" dirty="0" err="1" smtClean="0">
+                <a:latin typeface="Times New Roman" pitchFamily="18" charset="0"/>
+                <a:cs typeface="Times New Roman" pitchFamily="18" charset="0"/>
+              </a:rPr>
+              <a:t>tấm</a:t>
+            </a:r>
+            <a:r>
+              <a:rPr lang="en-US" sz="3200" dirty="0" smtClean="0">
+                <a:latin typeface="Times New Roman" pitchFamily="18" charset="0"/>
+                <a:cs typeface="Times New Roman" pitchFamily="18" charset="0"/>
+              </a:rPr>
+              <a:t> Poster.</a:t>
+            </a:r>
+            <a:endParaRPr lang="en-US" sz="3200" dirty="0" smtClean="0">
+              <a:latin typeface="Times New Roman" pitchFamily="18" charset="0"/>
+              <a:cs typeface="Times New Roman" pitchFamily="18" charset="0"/>
+            </a:endParaRPr>
+          </a:p>
+          <a:p>
+            <a:r>
+              <a:rPr lang="en-US" sz="3200" b="1" dirty="0" err="1" smtClean="0">
+                <a:latin typeface="Times New Roman" pitchFamily="18" charset="0"/>
+                <a:cs typeface="Times New Roman" pitchFamily="18" charset="0"/>
+              </a:rPr>
+              <a:t>Hệ</a:t>
+            </a:r>
+            <a:r>
+              <a:rPr lang="en-US" sz="3200" b="1" dirty="0" smtClean="0">
+                <a:latin typeface="Times New Roman" pitchFamily="18" charset="0"/>
+                <a:cs typeface="Times New Roman" pitchFamily="18" charset="0"/>
+              </a:rPr>
+              <a:t> </a:t>
+            </a:r>
+            <a:r>
+              <a:rPr lang="en-US" sz="3200" b="1" dirty="0" err="1" smtClean="0">
+                <a:latin typeface="Times New Roman" pitchFamily="18" charset="0"/>
+                <a:cs typeface="Times New Roman" pitchFamily="18" charset="0"/>
+              </a:rPr>
+              <a:t>thống</a:t>
+            </a:r>
+            <a:r>
+              <a:rPr lang="en-US" sz="3200" b="1" dirty="0" smtClean="0">
+                <a:latin typeface="Times New Roman" pitchFamily="18" charset="0"/>
+                <a:cs typeface="Times New Roman" pitchFamily="18" charset="0"/>
+              </a:rPr>
+              <a:t> </a:t>
+            </a:r>
+            <a:r>
+              <a:rPr lang="en-US" sz="3200" b="1" dirty="0" err="1" smtClean="0">
+                <a:latin typeface="Times New Roman" pitchFamily="18" charset="0"/>
+                <a:cs typeface="Times New Roman" pitchFamily="18" charset="0"/>
+              </a:rPr>
+              <a:t>nhân</a:t>
+            </a:r>
+            <a:r>
+              <a:rPr lang="en-US" sz="3200" b="1" dirty="0" smtClean="0">
+                <a:latin typeface="Times New Roman" pitchFamily="18" charset="0"/>
+                <a:cs typeface="Times New Roman" pitchFamily="18" charset="0"/>
+              </a:rPr>
+              <a:t> </a:t>
+            </a:r>
+            <a:r>
+              <a:rPr lang="en-US" sz="3200" b="1" dirty="0" err="1" smtClean="0">
+                <a:latin typeface="Times New Roman" pitchFamily="18" charset="0"/>
+                <a:cs typeface="Times New Roman" pitchFamily="18" charset="0"/>
+              </a:rPr>
+              <a:t>vật</a:t>
+            </a:r>
+            <a:r>
+              <a:rPr lang="en-US" sz="3200" b="1" dirty="0" smtClean="0">
+                <a:latin typeface="Times New Roman" pitchFamily="18" charset="0"/>
+                <a:cs typeface="Times New Roman" pitchFamily="18" charset="0"/>
+              </a:rPr>
+              <a:t>:</a:t>
+            </a:r>
+            <a:br>
+              <a:rPr lang="en-US" sz="3200" b="1" dirty="0" smtClean="0">
+                <a:latin typeface="Times New Roman" pitchFamily="18" charset="0"/>
+                <a:cs typeface="Times New Roman" pitchFamily="18" charset="0"/>
+              </a:rPr>
+            </a:br>
+            <a:r>
+              <a:rPr lang="en-US" sz="2800" dirty="0" err="1" smtClean="0"/>
+              <a:t>Nhân</a:t>
+            </a:r>
+            <a:r>
+              <a:rPr lang="en-US" sz="2800" dirty="0" smtClean="0"/>
+              <a:t> </a:t>
+            </a:r>
+            <a:r>
+              <a:rPr lang="en-US" sz="2800" dirty="0" err="1"/>
+              <a:t>vật</a:t>
+            </a:r>
+            <a:r>
+              <a:rPr lang="en-US" sz="2800" dirty="0"/>
+              <a:t> </a:t>
+            </a:r>
+            <a:r>
+              <a:rPr lang="en-US" sz="2800" dirty="0" err="1"/>
+              <a:t>chính</a:t>
+            </a:r>
+            <a:r>
+              <a:rPr lang="en-US" sz="2800" dirty="0"/>
+              <a:t>: </a:t>
+            </a:r>
+            <a:r>
+              <a:rPr lang="en-US" sz="2800" dirty="0" err="1" smtClean="0"/>
+              <a:t>Thái</a:t>
+            </a:r>
+            <a:r>
+              <a:rPr lang="en-US" sz="2800" dirty="0"/>
+              <a:t/>
+            </a:r>
+            <a:br>
+              <a:rPr lang="en-US" sz="2800" dirty="0"/>
+            </a:br>
+            <a:r>
+              <a:rPr lang="en-US" sz="2800" dirty="0" err="1" smtClean="0"/>
+              <a:t>Nhân</a:t>
+            </a:r>
+            <a:r>
+              <a:rPr lang="en-US" sz="2800" dirty="0" smtClean="0"/>
+              <a:t> </a:t>
+            </a:r>
+            <a:r>
+              <a:rPr lang="en-US" sz="2800" dirty="0" err="1"/>
+              <a:t>vật</a:t>
+            </a:r>
+            <a:r>
+              <a:rPr lang="en-US" sz="2800" dirty="0"/>
+              <a:t> </a:t>
+            </a:r>
+            <a:r>
+              <a:rPr lang="en-US" sz="2800" dirty="0" err="1" smtClean="0"/>
+              <a:t>phụ</a:t>
+            </a:r>
+            <a:r>
+              <a:rPr lang="en-US" sz="2800" dirty="0" smtClean="0"/>
+              <a:t>:</a:t>
+            </a:r>
+            <a:br>
+              <a:rPr lang="en-US" sz="2800" dirty="0" smtClean="0"/>
+            </a:br>
+            <a:r>
+              <a:rPr lang="en-US" sz="2800" dirty="0" err="1" smtClean="0"/>
+              <a:t>Vũ</a:t>
+            </a:r>
+            <a:r>
+              <a:rPr lang="en-US" sz="2800" dirty="0" smtClean="0"/>
+              <a:t> </a:t>
+            </a:r>
+            <a:r>
+              <a:rPr lang="en-US" sz="2800" dirty="0" err="1"/>
+              <a:t>và</a:t>
+            </a:r>
+            <a:r>
+              <a:rPr lang="en-US" sz="2800" dirty="0"/>
+              <a:t> </a:t>
+            </a:r>
+            <a:r>
+              <a:rPr lang="en-US" sz="2800" dirty="0" err="1"/>
+              <a:t>Thịnh</a:t>
+            </a:r>
+            <a:r>
+              <a:rPr lang="en-US" sz="2800" dirty="0"/>
+              <a:t> (</a:t>
+            </a:r>
+            <a:r>
+              <a:rPr lang="en-US" sz="2800" dirty="0" err="1"/>
+              <a:t>là</a:t>
+            </a:r>
+            <a:r>
+              <a:rPr lang="en-US" sz="2800" dirty="0"/>
+              <a:t> </a:t>
+            </a:r>
+            <a:r>
+              <a:rPr lang="en-US" sz="2800" dirty="0" err="1"/>
+              <a:t>bạn</a:t>
+            </a:r>
+            <a:r>
+              <a:rPr lang="en-US" sz="2800" dirty="0"/>
+              <a:t> </a:t>
+            </a:r>
+            <a:r>
+              <a:rPr lang="en-US" sz="2800" dirty="0" err="1"/>
+              <a:t>của</a:t>
+            </a:r>
+            <a:r>
+              <a:rPr lang="en-US" sz="2800" dirty="0"/>
+              <a:t> </a:t>
+            </a:r>
+            <a:r>
+              <a:rPr lang="en-US" sz="2800" dirty="0" err="1" smtClean="0"/>
+              <a:t>Thái</a:t>
+            </a:r>
+            <a:r>
+              <a:rPr lang="en-US" sz="2800" dirty="0" smtClean="0"/>
+              <a:t>)</a:t>
+            </a:r>
+            <a:br>
+              <a:rPr lang="en-US" sz="2800" dirty="0" smtClean="0"/>
+            </a:br>
+            <a:r>
+              <a:rPr lang="en-US" sz="2800" dirty="0" err="1" smtClean="0"/>
+              <a:t>Hiếu</a:t>
+            </a:r>
+            <a:r>
+              <a:rPr lang="en-US" sz="2800" dirty="0" smtClean="0"/>
+              <a:t> </a:t>
+            </a:r>
+            <a:r>
+              <a:rPr lang="en-US" sz="2800" dirty="0"/>
+              <a:t>(</a:t>
+            </a:r>
+            <a:r>
+              <a:rPr lang="en-US" sz="2800" dirty="0" err="1"/>
+              <a:t>chàng</a:t>
+            </a:r>
+            <a:r>
+              <a:rPr lang="en-US" sz="2800" dirty="0"/>
+              <a:t> </a:t>
+            </a:r>
+            <a:r>
+              <a:rPr lang="en-US" sz="2800" dirty="0" err="1"/>
+              <a:t>sinh</a:t>
+            </a:r>
+            <a:r>
+              <a:rPr lang="en-US" sz="2800" dirty="0"/>
+              <a:t> </a:t>
+            </a:r>
+            <a:r>
+              <a:rPr lang="en-US" sz="2800" dirty="0" err="1" smtClean="0"/>
+              <a:t>viên</a:t>
+            </a:r>
+            <a:r>
+              <a:rPr lang="en-US" sz="2800" dirty="0" smtClean="0"/>
+              <a:t>)</a:t>
+            </a:r>
+            <a:br>
+              <a:rPr lang="en-US" sz="2800" dirty="0" smtClean="0"/>
+            </a:br>
+            <a:r>
+              <a:rPr lang="en-US" sz="2800" dirty="0" err="1" smtClean="0"/>
+              <a:t>Dương</a:t>
+            </a:r>
+            <a:r>
+              <a:rPr lang="en-US" sz="2800" dirty="0" smtClean="0"/>
+              <a:t> </a:t>
+            </a:r>
+            <a:r>
+              <a:rPr lang="en-US" sz="2800" dirty="0"/>
+              <a:t>(</a:t>
+            </a:r>
+            <a:r>
+              <a:rPr lang="en-US" sz="2800" dirty="0" err="1"/>
+              <a:t>giám</a:t>
+            </a:r>
+            <a:r>
+              <a:rPr lang="en-US" sz="2800" dirty="0"/>
+              <a:t> </a:t>
+            </a:r>
+            <a:r>
+              <a:rPr lang="en-US" sz="2800" dirty="0" err="1" smtClean="0"/>
+              <a:t>đốc</a:t>
+            </a:r>
+            <a:r>
+              <a:rPr lang="en-US" sz="2800" dirty="0" smtClean="0"/>
+              <a:t>)</a:t>
+            </a:r>
+            <a:br>
+              <a:rPr lang="en-US" sz="2800" dirty="0" smtClean="0"/>
+            </a:br>
+            <a:r>
+              <a:rPr lang="en-US" sz="2800" dirty="0" err="1" smtClean="0"/>
+              <a:t>Thuận</a:t>
+            </a:r>
+            <a:r>
+              <a:rPr lang="en-US" sz="2800" dirty="0" smtClean="0"/>
+              <a:t> </a:t>
+            </a:r>
+            <a:r>
+              <a:rPr lang="en-US" sz="2800" dirty="0"/>
+              <a:t>(</a:t>
+            </a:r>
+            <a:r>
+              <a:rPr lang="en-US" sz="2800" dirty="0" err="1"/>
+              <a:t>khách</a:t>
+            </a:r>
+            <a:r>
+              <a:rPr lang="en-US" sz="2800" dirty="0"/>
+              <a:t> </a:t>
+            </a:r>
+            <a:r>
+              <a:rPr lang="en-US" sz="2800" dirty="0" err="1"/>
+              <a:t>hàng</a:t>
+            </a:r>
+            <a:r>
+              <a:rPr lang="en-US" sz="2800" dirty="0"/>
+              <a:t>)</a:t>
+            </a:r>
+          </a:p>
+          <a:p>
+            <a:endParaRPr lang="en-US" sz="2800" b="1" dirty="0">
+              <a:latin typeface="Times New Roman" pitchFamily="18" charset="0"/>
+              <a:cs typeface="Times New Roman" pitchFamily="18" charset="0"/>
+            </a:endParaRPr>
           </a:p>
         </p:txBody>
       </p:sp>
@@ -16123,7 +16733,7 @@
     </p:spTree>
     <p:extLst>
       <p:ext uri="{BB962C8B-B14F-4D97-AF65-F5344CB8AC3E}">
-        <p14:creationId xmlns:p14="http://schemas.microsoft.com/office/powerpoint/2010/main" val="2273455860"/>
+        <p14:creationId xmlns:p14="http://schemas.microsoft.com/office/powerpoint/2010/main" val="3501282844"/>
       </p:ext>
     </p:extLst>
   </p:cSld>
@@ -16169,197 +16779,1128 @@
         </p:nvSpPr>
         <p:spPr>
           <a:xfrm>
-            <a:off x="685801" y="533400"/>
-            <a:ext cx="7594600" cy="5592763"/>
+            <a:off x="619190" y="1295400"/>
+            <a:ext cx="7670800" cy="4449763"/>
           </a:xfrm>
         </p:spPr>
         <p:txBody>
           <a:bodyPr>
-            <a:normAutofit/>
+            <a:noAutofit/>
           </a:bodyPr>
           <a:lstStyle/>
           <a:p>
             <a:r>
-              <a:rPr lang="en-US" sz="2000" b="1" dirty="0" err="1" smtClean="0">
+              <a:rPr lang="en-US" b="1" dirty="0" err="1" smtClean="0">
                 <a:latin typeface="Times New Roman" pitchFamily="18" charset="0"/>
                 <a:cs typeface="Times New Roman" pitchFamily="18" charset="0"/>
               </a:rPr>
-              <a:t>Kịch</a:t>
-            </a:r>
-            <a:r>
-              <a:rPr lang="en-US" sz="2000" b="1" dirty="0" smtClean="0">
+              <a:t>Lên</a:t>
+            </a:r>
+            <a:r>
+              <a:rPr lang="en-US" b="1" dirty="0" smtClean="0">
                 <a:latin typeface="Times New Roman" pitchFamily="18" charset="0"/>
                 <a:cs typeface="Times New Roman" pitchFamily="18" charset="0"/>
               </a:rPr>
               <a:t> </a:t>
             </a:r>
             <a:r>
-              <a:rPr lang="en-US" sz="2000" b="1" dirty="0" err="1" smtClean="0">
+              <a:rPr lang="en-US" b="1" dirty="0" err="1" smtClean="0">
                 <a:latin typeface="Times New Roman" pitchFamily="18" charset="0"/>
                 <a:cs typeface="Times New Roman" pitchFamily="18" charset="0"/>
               </a:rPr>
-              <a:t>bản</a:t>
-            </a:r>
-            <a:r>
-              <a:rPr lang="en-US" sz="2000" b="1" dirty="0" smtClean="0">
+              <a:t>kế</a:t>
+            </a:r>
+            <a:r>
+              <a:rPr lang="en-US" b="1" dirty="0" smtClean="0">
                 <a:latin typeface="Times New Roman" pitchFamily="18" charset="0"/>
                 <a:cs typeface="Times New Roman" pitchFamily="18" charset="0"/>
               </a:rPr>
-              <a:t> “</a:t>
-            </a:r>
-            <a:r>
-              <a:rPr lang="en-US" sz="2000" b="1" dirty="0" err="1" smtClean="0">
+              <a:t> </a:t>
+            </a:r>
+            <a:r>
+              <a:rPr lang="en-US" b="1" dirty="0" err="1" smtClean="0">
                 <a:latin typeface="Times New Roman" pitchFamily="18" charset="0"/>
                 <a:cs typeface="Times New Roman" pitchFamily="18" charset="0"/>
               </a:rPr>
-              <a:t>Ước</a:t>
-            </a:r>
-            <a:r>
-              <a:rPr lang="en-US" sz="2000" b="1" dirty="0" smtClean="0">
+              <a:t>hoạch</a:t>
+            </a:r>
+            <a:r>
+              <a:rPr lang="en-US" b="1" dirty="0" smtClean="0">
                 <a:latin typeface="Times New Roman" pitchFamily="18" charset="0"/>
                 <a:cs typeface="Times New Roman" pitchFamily="18" charset="0"/>
               </a:rPr>
-              <a:t> </a:t>
-            </a:r>
-            <a:r>
-              <a:rPr lang="en-US" sz="2000" b="1" dirty="0" err="1" smtClean="0">
+              <a:t>:</a:t>
+            </a:r>
+            <a:br>
+              <a:rPr lang="en-US" b="1" dirty="0" smtClean="0">
                 <a:latin typeface="Times New Roman" pitchFamily="18" charset="0"/>
                 <a:cs typeface="Times New Roman" pitchFamily="18" charset="0"/>
               </a:rPr>
-              <a:t>mơ</a:t>
-            </a:r>
-            <a:r>
-              <a:rPr lang="en-US" sz="2000" b="1" dirty="0" smtClean="0">
+            </a:br>
+            <a:r>
+              <a:rPr lang="en-US" dirty="0" err="1" smtClean="0">
                 <a:latin typeface="Times New Roman" pitchFamily="18" charset="0"/>
                 <a:cs typeface="Times New Roman" pitchFamily="18" charset="0"/>
               </a:rPr>
-              <a:t> </a:t>
-            </a:r>
-            <a:r>
-              <a:rPr lang="en-US" sz="2000" b="1" dirty="0" err="1" smtClean="0">
+              <a:t>Lịch</a:t>
+            </a:r>
+            <a:r>
+              <a:rPr lang="en-US" dirty="0" smtClean="0">
                 <a:latin typeface="Times New Roman" pitchFamily="18" charset="0"/>
                 <a:cs typeface="Times New Roman" pitchFamily="18" charset="0"/>
               </a:rPr>
-              <a:t>đầu</a:t>
-            </a:r>
-            <a:r>
-              <a:rPr lang="en-US" sz="2000" b="1" dirty="0" smtClean="0">
+              <a:t> quay </a:t>
+            </a:r>
+            <a:r>
+              <a:rPr lang="en-US" dirty="0" err="1" smtClean="0">
                 <a:latin typeface="Times New Roman" pitchFamily="18" charset="0"/>
                 <a:cs typeface="Times New Roman" pitchFamily="18" charset="0"/>
               </a:rPr>
-              <a:t> </a:t>
-            </a:r>
-            <a:r>
-              <a:rPr lang="en-US" sz="2000" b="1" dirty="0" err="1" smtClean="0">
+              <a:t>được</a:t>
+            </a:r>
+            <a:r>
+              <a:rPr lang="en-US" dirty="0" smtClean="0">
                 <a:latin typeface="Times New Roman" pitchFamily="18" charset="0"/>
                 <a:cs typeface="Times New Roman" pitchFamily="18" charset="0"/>
               </a:rPr>
-              <a:t>đời</a:t>
-            </a:r>
-            <a:r>
-              <a:rPr lang="en-US" sz="2000" b="1" dirty="0" smtClean="0">
+              <a:t> </a:t>
+            </a:r>
+            <a:r>
+              <a:rPr lang="en-US" dirty="0" err="1" smtClean="0">
                 <a:latin typeface="Times New Roman" pitchFamily="18" charset="0"/>
                 <a:cs typeface="Times New Roman" pitchFamily="18" charset="0"/>
               </a:rPr>
-              <a:t>”</a:t>
-            </a:r>
+              <a:t>sắp</a:t>
+            </a:r>
+            <a:r>
+              <a:rPr lang="en-US" dirty="0" smtClean="0">
+                <a:latin typeface="Times New Roman" pitchFamily="18" charset="0"/>
+                <a:cs typeface="Times New Roman" pitchFamily="18" charset="0"/>
+              </a:rPr>
+              <a:t> </a:t>
+            </a:r>
+            <a:r>
+              <a:rPr lang="en-US" dirty="0" err="1" smtClean="0">
+                <a:latin typeface="Times New Roman" pitchFamily="18" charset="0"/>
+                <a:cs typeface="Times New Roman" pitchFamily="18" charset="0"/>
+              </a:rPr>
+              <a:t>xếp</a:t>
+            </a:r>
+            <a:r>
+              <a:rPr lang="en-US" dirty="0" smtClean="0">
+                <a:latin typeface="Times New Roman" pitchFamily="18" charset="0"/>
+                <a:cs typeface="Times New Roman" pitchFamily="18" charset="0"/>
+              </a:rPr>
+              <a:t> </a:t>
+            </a:r>
+            <a:r>
+              <a:rPr lang="en-US" dirty="0" err="1" smtClean="0">
+                <a:latin typeface="Times New Roman" pitchFamily="18" charset="0"/>
+                <a:cs typeface="Times New Roman" pitchFamily="18" charset="0"/>
+              </a:rPr>
+              <a:t>theo</a:t>
+            </a:r>
+            <a:r>
+              <a:rPr lang="en-US" dirty="0" smtClean="0">
+                <a:latin typeface="Times New Roman" pitchFamily="18" charset="0"/>
+                <a:cs typeface="Times New Roman" pitchFamily="18" charset="0"/>
+              </a:rPr>
+              <a:t> </a:t>
+            </a:r>
+            <a:r>
+              <a:rPr lang="en-US" dirty="0" err="1" smtClean="0">
+                <a:latin typeface="Times New Roman" pitchFamily="18" charset="0"/>
+                <a:cs typeface="Times New Roman" pitchFamily="18" charset="0"/>
+              </a:rPr>
+              <a:t>thời</a:t>
+            </a:r>
+            <a:r>
+              <a:rPr lang="en-US" dirty="0" smtClean="0">
+                <a:latin typeface="Times New Roman" pitchFamily="18" charset="0"/>
+                <a:cs typeface="Times New Roman" pitchFamily="18" charset="0"/>
+              </a:rPr>
+              <a:t> </a:t>
+            </a:r>
+            <a:r>
+              <a:rPr lang="en-US" dirty="0" err="1" smtClean="0">
+                <a:latin typeface="Times New Roman" pitchFamily="18" charset="0"/>
+                <a:cs typeface="Times New Roman" pitchFamily="18" charset="0"/>
+              </a:rPr>
+              <a:t>gian</a:t>
+            </a:r>
+            <a:r>
+              <a:rPr lang="en-US" dirty="0" smtClean="0">
+                <a:latin typeface="Times New Roman" pitchFamily="18" charset="0"/>
+                <a:cs typeface="Times New Roman" pitchFamily="18" charset="0"/>
+              </a:rPr>
+              <a:t> </a:t>
+            </a:r>
+            <a:r>
+              <a:rPr lang="en-US" dirty="0" err="1" smtClean="0">
+                <a:latin typeface="Times New Roman" pitchFamily="18" charset="0"/>
+                <a:cs typeface="Times New Roman" pitchFamily="18" charset="0"/>
+              </a:rPr>
+              <a:t>rảnh</a:t>
+            </a:r>
+            <a:r>
+              <a:rPr lang="en-US" dirty="0" smtClean="0">
+                <a:latin typeface="Times New Roman" pitchFamily="18" charset="0"/>
+                <a:cs typeface="Times New Roman" pitchFamily="18" charset="0"/>
+              </a:rPr>
+              <a:t> </a:t>
+            </a:r>
+            <a:r>
+              <a:rPr lang="en-US" dirty="0" err="1" smtClean="0">
+                <a:latin typeface="Times New Roman" pitchFamily="18" charset="0"/>
+                <a:cs typeface="Times New Roman" pitchFamily="18" charset="0"/>
+              </a:rPr>
+              <a:t>của</a:t>
+            </a:r>
+            <a:r>
+              <a:rPr lang="en-US" dirty="0" smtClean="0">
+                <a:latin typeface="Times New Roman" pitchFamily="18" charset="0"/>
+                <a:cs typeface="Times New Roman" pitchFamily="18" charset="0"/>
+              </a:rPr>
+              <a:t> </a:t>
+            </a:r>
+            <a:r>
+              <a:rPr lang="en-US" dirty="0" err="1" smtClean="0">
+                <a:latin typeface="Times New Roman" pitchFamily="18" charset="0"/>
+                <a:cs typeface="Times New Roman" pitchFamily="18" charset="0"/>
+              </a:rPr>
+              <a:t>từng</a:t>
+            </a:r>
+            <a:r>
+              <a:rPr lang="en-US" dirty="0" smtClean="0">
+                <a:latin typeface="Times New Roman" pitchFamily="18" charset="0"/>
+                <a:cs typeface="Times New Roman" pitchFamily="18" charset="0"/>
+              </a:rPr>
+              <a:t> </a:t>
+            </a:r>
+            <a:r>
+              <a:rPr lang="en-US" dirty="0" err="1" smtClean="0">
+                <a:latin typeface="Times New Roman" pitchFamily="18" charset="0"/>
+                <a:cs typeface="Times New Roman" pitchFamily="18" charset="0"/>
+              </a:rPr>
+              <a:t>thành</a:t>
+            </a:r>
+            <a:r>
+              <a:rPr lang="en-US" dirty="0" smtClean="0">
+                <a:latin typeface="Times New Roman" pitchFamily="18" charset="0"/>
+                <a:cs typeface="Times New Roman" pitchFamily="18" charset="0"/>
+              </a:rPr>
+              <a:t> </a:t>
+            </a:r>
+            <a:r>
+              <a:rPr lang="en-US" dirty="0" err="1" smtClean="0">
+                <a:latin typeface="Times New Roman" pitchFamily="18" charset="0"/>
+                <a:cs typeface="Times New Roman" pitchFamily="18" charset="0"/>
+              </a:rPr>
+              <a:t>viên</a:t>
+            </a:r>
+            <a:r>
+              <a:rPr lang="en-US" dirty="0" smtClean="0">
+                <a:latin typeface="Times New Roman" pitchFamily="18" charset="0"/>
+                <a:cs typeface="Times New Roman" pitchFamily="18" charset="0"/>
+              </a:rPr>
+              <a:t>.</a:t>
+            </a:r>
+            <a:endParaRPr lang="en-US" dirty="0" smtClean="0">
+              <a:latin typeface="Times New Roman" pitchFamily="18" charset="0"/>
+              <a:cs typeface="Times New Roman" pitchFamily="18" charset="0"/>
+            </a:endParaRPr>
           </a:p>
           <a:p>
-            <a:pPr marL="0" indent="0">
-              <a:buNone/>
-            </a:pPr>
-            <a:r>
-              <a:rPr lang="en-US" sz="2000" b="1" dirty="0" smtClean="0">
+            <a:r>
+              <a:rPr lang="en-US" b="1" dirty="0" err="1" smtClean="0">
                 <a:latin typeface="Times New Roman" pitchFamily="18" charset="0"/>
                 <a:cs typeface="Times New Roman" pitchFamily="18" charset="0"/>
               </a:rPr>
-              <a:t>	</a:t>
-            </a:r>
-            <a:r>
-              <a:rPr lang="en-US" sz="2000" b="1" dirty="0" err="1" smtClean="0">
+              <a:t>Cảnh</a:t>
+            </a:r>
+            <a:r>
+              <a:rPr lang="en-US" b="1" dirty="0" smtClean="0">
                 <a:latin typeface="Times New Roman" pitchFamily="18" charset="0"/>
                 <a:cs typeface="Times New Roman" pitchFamily="18" charset="0"/>
               </a:rPr>
-              <a:t>Nội</a:t>
-            </a:r>
-            <a:r>
-              <a:rPr lang="en-US" sz="2000" b="1" dirty="0" smtClean="0">
+              <a:t> </a:t>
+            </a:r>
+            <a:r>
+              <a:rPr lang="en-US" b="1" dirty="0" smtClean="0">
                 <a:latin typeface="Times New Roman" pitchFamily="18" charset="0"/>
                 <a:cs typeface="Times New Roman" pitchFamily="18" charset="0"/>
               </a:rPr>
-              <a:t> dung:</a:t>
-            </a:r>
+              <a:t>quay:</a:t>
+            </a:r>
+            <a:br>
+              <a:rPr lang="en-US" b="1" dirty="0" smtClean="0">
+                <a:latin typeface="Times New Roman" pitchFamily="18" charset="0"/>
+                <a:cs typeface="Times New Roman" pitchFamily="18" charset="0"/>
+              </a:rPr>
+            </a:br>
+            <a:r>
+              <a:rPr lang="en-US" dirty="0" err="1" smtClean="0">
+                <a:latin typeface="Times New Roman" pitchFamily="18" charset="0"/>
+                <a:cs typeface="Times New Roman" pitchFamily="18" charset="0"/>
+              </a:rPr>
+              <a:t>Các</a:t>
+            </a:r>
+            <a:r>
+              <a:rPr lang="en-US" dirty="0" smtClean="0">
+                <a:latin typeface="Times New Roman" pitchFamily="18" charset="0"/>
+                <a:cs typeface="Times New Roman" pitchFamily="18" charset="0"/>
+              </a:rPr>
+              <a:t> </a:t>
+            </a:r>
+            <a:r>
+              <a:rPr lang="en-US" dirty="0" err="1" smtClean="0">
+                <a:latin typeface="Times New Roman" pitchFamily="18" charset="0"/>
+                <a:cs typeface="Times New Roman" pitchFamily="18" charset="0"/>
+              </a:rPr>
+              <a:t>cảnh</a:t>
+            </a:r>
+            <a:r>
+              <a:rPr lang="en-US" dirty="0" smtClean="0">
+                <a:latin typeface="Times New Roman" pitchFamily="18" charset="0"/>
+                <a:cs typeface="Times New Roman" pitchFamily="18" charset="0"/>
+              </a:rPr>
+              <a:t> quay </a:t>
+            </a:r>
+            <a:r>
+              <a:rPr lang="en-US" dirty="0" err="1" smtClean="0">
+                <a:latin typeface="Times New Roman" pitchFamily="18" charset="0"/>
+                <a:cs typeface="Times New Roman" pitchFamily="18" charset="0"/>
+              </a:rPr>
+              <a:t>được</a:t>
+            </a:r>
+            <a:r>
+              <a:rPr lang="en-US" dirty="0" smtClean="0">
+                <a:latin typeface="Times New Roman" pitchFamily="18" charset="0"/>
+                <a:cs typeface="Times New Roman" pitchFamily="18" charset="0"/>
+              </a:rPr>
+              <a:t> </a:t>
+            </a:r>
+            <a:r>
+              <a:rPr lang="en-US" dirty="0" err="1" smtClean="0">
+                <a:latin typeface="Times New Roman" pitchFamily="18" charset="0"/>
+                <a:cs typeface="Times New Roman" pitchFamily="18" charset="0"/>
+              </a:rPr>
+              <a:t>lựa</a:t>
+            </a:r>
+            <a:r>
+              <a:rPr lang="en-US" dirty="0" smtClean="0">
+                <a:latin typeface="Times New Roman" pitchFamily="18" charset="0"/>
+                <a:cs typeface="Times New Roman" pitchFamily="18" charset="0"/>
+              </a:rPr>
+              <a:t> </a:t>
+            </a:r>
+            <a:r>
+              <a:rPr lang="en-US" dirty="0" err="1" smtClean="0">
+                <a:latin typeface="Times New Roman" pitchFamily="18" charset="0"/>
+                <a:cs typeface="Times New Roman" pitchFamily="18" charset="0"/>
+              </a:rPr>
+              <a:t>chọn</a:t>
+            </a:r>
+            <a:r>
+              <a:rPr lang="en-US" dirty="0" smtClean="0">
+                <a:latin typeface="Times New Roman" pitchFamily="18" charset="0"/>
+                <a:cs typeface="Times New Roman" pitchFamily="18" charset="0"/>
+              </a:rPr>
+              <a:t>: </a:t>
+            </a:r>
+            <a:r>
+              <a:rPr lang="en-US" dirty="0" err="1" smtClean="0">
+                <a:latin typeface="Times New Roman" pitchFamily="18" charset="0"/>
+                <a:cs typeface="Times New Roman" pitchFamily="18" charset="0"/>
+              </a:rPr>
+              <a:t>Trước</a:t>
+            </a:r>
+            <a:r>
+              <a:rPr lang="en-US" dirty="0" smtClean="0">
+                <a:latin typeface="Times New Roman" pitchFamily="18" charset="0"/>
+                <a:cs typeface="Times New Roman" pitchFamily="18" charset="0"/>
+              </a:rPr>
+              <a:t> </a:t>
+            </a:r>
+            <a:r>
+              <a:rPr lang="en-US" dirty="0" err="1" smtClean="0">
+                <a:latin typeface="Times New Roman" pitchFamily="18" charset="0"/>
+                <a:cs typeface="Times New Roman" pitchFamily="18" charset="0"/>
+              </a:rPr>
+              <a:t>cổng</a:t>
+            </a:r>
+            <a:r>
+              <a:rPr lang="en-US" dirty="0" smtClean="0">
+                <a:latin typeface="Times New Roman" pitchFamily="18" charset="0"/>
+                <a:cs typeface="Times New Roman" pitchFamily="18" charset="0"/>
+              </a:rPr>
+              <a:t> </a:t>
+            </a:r>
+            <a:r>
+              <a:rPr lang="en-US" dirty="0" err="1" smtClean="0">
+                <a:latin typeface="Times New Roman" pitchFamily="18" charset="0"/>
+                <a:cs typeface="Times New Roman" pitchFamily="18" charset="0"/>
+              </a:rPr>
+              <a:t>trường</a:t>
+            </a:r>
+            <a:r>
+              <a:rPr lang="en-US" dirty="0" smtClean="0">
+                <a:latin typeface="Times New Roman" pitchFamily="18" charset="0"/>
+                <a:cs typeface="Times New Roman" pitchFamily="18" charset="0"/>
+              </a:rPr>
+              <a:t>, </a:t>
+            </a:r>
+            <a:r>
+              <a:rPr lang="en-US" dirty="0" err="1" smtClean="0">
+                <a:latin typeface="Times New Roman" pitchFamily="18" charset="0"/>
+                <a:cs typeface="Times New Roman" pitchFamily="18" charset="0"/>
+              </a:rPr>
+              <a:t>Trong</a:t>
+            </a:r>
+            <a:r>
+              <a:rPr lang="en-US" dirty="0" smtClean="0">
+                <a:latin typeface="Times New Roman" pitchFamily="18" charset="0"/>
+                <a:cs typeface="Times New Roman" pitchFamily="18" charset="0"/>
+              </a:rPr>
+              <a:t> </a:t>
+            </a:r>
+            <a:r>
+              <a:rPr lang="en-US" dirty="0" err="1" smtClean="0">
+                <a:latin typeface="Times New Roman" pitchFamily="18" charset="0"/>
+                <a:cs typeface="Times New Roman" pitchFamily="18" charset="0"/>
+              </a:rPr>
+              <a:t>khuôn</a:t>
+            </a:r>
+            <a:r>
+              <a:rPr lang="en-US" dirty="0" smtClean="0">
+                <a:latin typeface="Times New Roman" pitchFamily="18" charset="0"/>
+                <a:cs typeface="Times New Roman" pitchFamily="18" charset="0"/>
+              </a:rPr>
+              <a:t> </a:t>
+            </a:r>
+            <a:r>
+              <a:rPr lang="en-US" dirty="0" err="1" smtClean="0">
+                <a:latin typeface="Times New Roman" pitchFamily="18" charset="0"/>
+                <a:cs typeface="Times New Roman" pitchFamily="18" charset="0"/>
+              </a:rPr>
+              <a:t>viên</a:t>
+            </a:r>
+            <a:r>
+              <a:rPr lang="en-US" dirty="0" smtClean="0">
+                <a:latin typeface="Times New Roman" pitchFamily="18" charset="0"/>
+                <a:cs typeface="Times New Roman" pitchFamily="18" charset="0"/>
+              </a:rPr>
+              <a:t> </a:t>
+            </a:r>
+            <a:r>
+              <a:rPr lang="en-US" dirty="0" err="1" smtClean="0">
+                <a:latin typeface="Times New Roman" pitchFamily="18" charset="0"/>
+                <a:cs typeface="Times New Roman" pitchFamily="18" charset="0"/>
+              </a:rPr>
+              <a:t>trường</a:t>
+            </a:r>
+            <a:r>
+              <a:rPr lang="en-US" dirty="0" smtClean="0">
+                <a:latin typeface="Times New Roman" pitchFamily="18" charset="0"/>
+                <a:cs typeface="Times New Roman" pitchFamily="18" charset="0"/>
+              </a:rPr>
+              <a:t>, </a:t>
+            </a:r>
+            <a:r>
+              <a:rPr lang="en-US" dirty="0" err="1" smtClean="0">
+                <a:latin typeface="Times New Roman" pitchFamily="18" charset="0"/>
+                <a:cs typeface="Times New Roman" pitchFamily="18" charset="0"/>
+              </a:rPr>
+              <a:t>Tại</a:t>
+            </a:r>
+            <a:r>
+              <a:rPr lang="en-US" dirty="0" smtClean="0">
+                <a:latin typeface="Times New Roman" pitchFamily="18" charset="0"/>
+                <a:cs typeface="Times New Roman" pitchFamily="18" charset="0"/>
+              </a:rPr>
+              <a:t> </a:t>
+            </a:r>
+            <a:r>
+              <a:rPr lang="en-US" dirty="0" err="1" smtClean="0">
+                <a:latin typeface="Times New Roman" pitchFamily="18" charset="0"/>
+                <a:cs typeface="Times New Roman" pitchFamily="18" charset="0"/>
+              </a:rPr>
+              <a:t>phòng</a:t>
+            </a:r>
+            <a:r>
+              <a:rPr lang="en-US" dirty="0" smtClean="0">
+                <a:latin typeface="Times New Roman" pitchFamily="18" charset="0"/>
+                <a:cs typeface="Times New Roman" pitchFamily="18" charset="0"/>
+              </a:rPr>
+              <a:t> </a:t>
+            </a:r>
+            <a:r>
+              <a:rPr lang="en-US" dirty="0" err="1" smtClean="0">
+                <a:latin typeface="Times New Roman" pitchFamily="18" charset="0"/>
+                <a:cs typeface="Times New Roman" pitchFamily="18" charset="0"/>
+              </a:rPr>
+              <a:t>trọ</a:t>
+            </a:r>
+            <a:r>
+              <a:rPr lang="en-US" dirty="0" smtClean="0">
+                <a:latin typeface="Times New Roman" pitchFamily="18" charset="0"/>
+                <a:cs typeface="Times New Roman" pitchFamily="18" charset="0"/>
+              </a:rPr>
+              <a:t>.</a:t>
+            </a:r>
+            <a:endParaRPr lang="en-US" dirty="0" smtClean="0">
+              <a:latin typeface="Times New Roman" pitchFamily="18" charset="0"/>
+              <a:cs typeface="Times New Roman" pitchFamily="18" charset="0"/>
+            </a:endParaRPr>
           </a:p>
           <a:p>
-            <a:pPr marL="0" indent="0">
-              <a:buNone/>
-            </a:pPr>
-            <a:r>
-              <a:rPr lang="en-US" sz="2000" b="1" dirty="0">
+            <a:r>
+              <a:rPr lang="en-US" b="1" dirty="0" err="1" smtClean="0">
                 <a:latin typeface="Times New Roman" pitchFamily="18" charset="0"/>
                 <a:cs typeface="Times New Roman" pitchFamily="18" charset="0"/>
               </a:rPr>
-              <a:t>	</a:t>
-            </a:r>
-            <a:r>
-              <a:rPr lang="en-US" sz="2000" b="1" dirty="0" err="1" smtClean="0">
+              <a:t>Diễn</a:t>
+            </a:r>
+            <a:r>
+              <a:rPr lang="en-US" b="1" dirty="0" smtClean="0">
                 <a:latin typeface="Times New Roman" pitchFamily="18" charset="0"/>
                 <a:cs typeface="Times New Roman" pitchFamily="18" charset="0"/>
               </a:rPr>
-              <a:t>Hệ</a:t>
-            </a:r>
-            <a:r>
-              <a:rPr lang="en-US" sz="2000" b="1" dirty="0" smtClean="0">
+              <a:t> </a:t>
+            </a:r>
+            <a:r>
+              <a:rPr lang="en-US" b="1" dirty="0" err="1" smtClean="0">
                 <a:latin typeface="Times New Roman" pitchFamily="18" charset="0"/>
                 <a:cs typeface="Times New Roman" pitchFamily="18" charset="0"/>
               </a:rPr>
-              <a:t> </a:t>
-            </a:r>
-            <a:r>
-              <a:rPr lang="en-US" sz="2000" b="1" dirty="0" err="1" smtClean="0">
+              <a:t>viên</a:t>
+            </a:r>
+            <a:r>
+              <a:rPr lang="en-US" b="1" dirty="0" smtClean="0">
                 <a:latin typeface="Times New Roman" pitchFamily="18" charset="0"/>
                 <a:cs typeface="Times New Roman" pitchFamily="18" charset="0"/>
               </a:rPr>
-              <a:t>thống</a:t>
-            </a:r>
-            <a:r>
-              <a:rPr lang="en-US" sz="2000" b="1" dirty="0" smtClean="0">
+              <a:t>:</a:t>
+            </a:r>
+            <a:br>
+              <a:rPr lang="en-US" b="1" dirty="0" smtClean="0">
                 <a:latin typeface="Times New Roman" pitchFamily="18" charset="0"/>
                 <a:cs typeface="Times New Roman" pitchFamily="18" charset="0"/>
               </a:rPr>
+            </a:br>
+            <a:r>
+              <a:rPr lang="en-US" dirty="0" smtClean="0">
+                <a:latin typeface="Times New Roman" panose="02020603050405020304" pitchFamily="18" charset="0"/>
+                <a:cs typeface="Times New Roman" panose="02020603050405020304" pitchFamily="18" charset="0"/>
+              </a:rPr>
+              <a:t>Phan </a:t>
+            </a:r>
+            <a:r>
+              <a:rPr lang="en-US" dirty="0" err="1">
+                <a:latin typeface="Times New Roman" panose="02020603050405020304" pitchFamily="18" charset="0"/>
+                <a:cs typeface="Times New Roman" panose="02020603050405020304" pitchFamily="18" charset="0"/>
+              </a:rPr>
+              <a:t>Duy</a:t>
+            </a:r>
+            <a:r>
+              <a:rPr lang="en-US" dirty="0">
+                <a:latin typeface="Times New Roman" panose="02020603050405020304" pitchFamily="18" charset="0"/>
+                <a:cs typeface="Times New Roman" panose="02020603050405020304" pitchFamily="18" charset="0"/>
+              </a:rPr>
               <a:t> </a:t>
             </a:r>
             <a:r>
-              <a:rPr lang="en-US" sz="2000" b="1" dirty="0" err="1" smtClean="0">
-                <a:latin typeface="Times New Roman" pitchFamily="18" charset="0"/>
-                <a:cs typeface="Times New Roman" pitchFamily="18" charset="0"/>
-              </a:rPr>
-              <a:t>nhân</a:t>
-            </a:r>
-            <a:r>
-              <a:rPr lang="en-US" sz="2000" b="1" dirty="0" smtClean="0">
-                <a:latin typeface="Times New Roman" pitchFamily="18" charset="0"/>
-                <a:cs typeface="Times New Roman" pitchFamily="18" charset="0"/>
+              <a:rPr lang="en-US" dirty="0" err="1" smtClean="0">
+                <a:latin typeface="Times New Roman" panose="02020603050405020304" pitchFamily="18" charset="0"/>
+                <a:cs typeface="Times New Roman" panose="02020603050405020304" pitchFamily="18" charset="0"/>
+              </a:rPr>
+              <a:t>Thái</a:t>
+            </a:r>
+            <a:r>
+              <a:rPr lang="en-US" dirty="0" smtClean="0">
+                <a:latin typeface="Times New Roman" panose="02020603050405020304" pitchFamily="18" charset="0"/>
+                <a:cs typeface="Times New Roman" panose="02020603050405020304" pitchFamily="18" charset="0"/>
+              </a:rPr>
+              <a:t> (</a:t>
+            </a:r>
+            <a:r>
+              <a:rPr lang="en-US" dirty="0" err="1" smtClean="0">
+                <a:latin typeface="Times New Roman" panose="02020603050405020304" pitchFamily="18" charset="0"/>
+                <a:cs typeface="Times New Roman" panose="02020603050405020304" pitchFamily="18" charset="0"/>
+              </a:rPr>
+              <a:t>Học</a:t>
+            </a:r>
+            <a:r>
+              <a:rPr lang="en-US" dirty="0" smtClean="0">
+                <a:latin typeface="Times New Roman" panose="02020603050405020304" pitchFamily="18" charset="0"/>
+                <a:cs typeface="Times New Roman" panose="02020603050405020304" pitchFamily="18" charset="0"/>
               </a:rPr>
               <a:t> </a:t>
             </a:r>
             <a:r>
-              <a:rPr lang="en-US" sz="2000" b="1" dirty="0" err="1" smtClean="0">
-                <a:latin typeface="Times New Roman" pitchFamily="18" charset="0"/>
-                <a:cs typeface="Times New Roman" pitchFamily="18" charset="0"/>
-              </a:rPr>
-              <a:t>vật</a:t>
-            </a:r>
-            <a:endParaRPr lang="en-US" sz="2000" b="1" dirty="0">
-              <a:latin typeface="Times New Roman" pitchFamily="18" charset="0"/>
-              <a:cs typeface="Times New Roman" pitchFamily="18" charset="0"/>
+              <a:rPr lang="en-US" dirty="0" err="1" smtClean="0">
+                <a:latin typeface="Times New Roman" panose="02020603050405020304" pitchFamily="18" charset="0"/>
+                <a:cs typeface="Times New Roman" panose="02020603050405020304" pitchFamily="18" charset="0"/>
+              </a:rPr>
+              <a:t>sinh</a:t>
+            </a:r>
+            <a:r>
+              <a:rPr lang="en-US" dirty="0" smtClean="0">
+                <a:latin typeface="Times New Roman" panose="02020603050405020304" pitchFamily="18" charset="0"/>
+                <a:cs typeface="Times New Roman" panose="02020603050405020304" pitchFamily="18" charset="0"/>
+              </a:rPr>
+              <a:t> </a:t>
+            </a:r>
+            <a:r>
+              <a:rPr lang="en-US" dirty="0" err="1" smtClean="0">
+                <a:latin typeface="Times New Roman" panose="02020603050405020304" pitchFamily="18" charset="0"/>
+                <a:cs typeface="Times New Roman" panose="02020603050405020304" pitchFamily="18" charset="0"/>
+              </a:rPr>
+              <a:t>Thái</a:t>
+            </a:r>
+            <a:r>
+              <a:rPr lang="en-US" dirty="0" smtClean="0">
+                <a:latin typeface="Times New Roman" panose="02020603050405020304" pitchFamily="18" charset="0"/>
+                <a:cs typeface="Times New Roman" panose="02020603050405020304" pitchFamily="18" charset="0"/>
+              </a:rPr>
+              <a:t>)</a:t>
+            </a:r>
+            <a:r>
+              <a:rPr lang="en-US" dirty="0">
+                <a:latin typeface="Times New Roman" panose="02020603050405020304" pitchFamily="18" charset="0"/>
+                <a:cs typeface="Times New Roman" panose="02020603050405020304" pitchFamily="18" charset="0"/>
+              </a:rPr>
+              <a:t/>
+            </a:r>
+            <a:br>
+              <a:rPr lang="en-US" dirty="0">
+                <a:latin typeface="Times New Roman" panose="02020603050405020304" pitchFamily="18" charset="0"/>
+                <a:cs typeface="Times New Roman" panose="02020603050405020304" pitchFamily="18" charset="0"/>
+              </a:rPr>
+            </a:br>
+            <a:r>
+              <a:rPr lang="en-US" dirty="0" err="1" smtClean="0">
+                <a:latin typeface="Times New Roman" panose="02020603050405020304" pitchFamily="18" charset="0"/>
+                <a:cs typeface="Times New Roman" panose="02020603050405020304" pitchFamily="18" charset="0"/>
+              </a:rPr>
+              <a:t>Trần</a:t>
+            </a:r>
+            <a:r>
+              <a:rPr lang="en-US" dirty="0" smtClean="0">
+                <a:latin typeface="Times New Roman" panose="02020603050405020304" pitchFamily="18" charset="0"/>
+                <a:cs typeface="Times New Roman" panose="02020603050405020304" pitchFamily="18" charset="0"/>
+              </a:rPr>
+              <a:t> </a:t>
+            </a:r>
+            <a:r>
+              <a:rPr lang="en-US" dirty="0">
+                <a:latin typeface="Times New Roman" panose="02020603050405020304" pitchFamily="18" charset="0"/>
+                <a:cs typeface="Times New Roman" panose="02020603050405020304" pitchFamily="18" charset="0"/>
+              </a:rPr>
+              <a:t>Minh </a:t>
+            </a:r>
+            <a:r>
+              <a:rPr lang="en-US" dirty="0" err="1" smtClean="0">
+                <a:latin typeface="Times New Roman" panose="02020603050405020304" pitchFamily="18" charset="0"/>
+                <a:cs typeface="Times New Roman" panose="02020603050405020304" pitchFamily="18" charset="0"/>
+              </a:rPr>
+              <a:t>Thuận</a:t>
+            </a:r>
+            <a:r>
+              <a:rPr lang="en-US" dirty="0" smtClean="0">
+                <a:latin typeface="Times New Roman" panose="02020603050405020304" pitchFamily="18" charset="0"/>
+                <a:cs typeface="Times New Roman" panose="02020603050405020304" pitchFamily="18" charset="0"/>
+              </a:rPr>
+              <a:t> ( </a:t>
+            </a:r>
+            <a:r>
+              <a:rPr lang="en-US" dirty="0" err="1" smtClean="0">
+                <a:latin typeface="Times New Roman" panose="02020603050405020304" pitchFamily="18" charset="0"/>
+                <a:cs typeface="Times New Roman" panose="02020603050405020304" pitchFamily="18" charset="0"/>
+              </a:rPr>
+              <a:t>Khách</a:t>
+            </a:r>
+            <a:r>
+              <a:rPr lang="en-US" dirty="0" smtClean="0">
+                <a:latin typeface="Times New Roman" panose="02020603050405020304" pitchFamily="18" charset="0"/>
+                <a:cs typeface="Times New Roman" panose="02020603050405020304" pitchFamily="18" charset="0"/>
+              </a:rPr>
+              <a:t> </a:t>
+            </a:r>
+            <a:r>
+              <a:rPr lang="en-US" dirty="0" err="1" smtClean="0">
+                <a:latin typeface="Times New Roman" panose="02020603050405020304" pitchFamily="18" charset="0"/>
+                <a:cs typeface="Times New Roman" panose="02020603050405020304" pitchFamily="18" charset="0"/>
+              </a:rPr>
+              <a:t>hàng</a:t>
+            </a:r>
+            <a:r>
+              <a:rPr lang="en-US" dirty="0" smtClean="0">
+                <a:latin typeface="Times New Roman" panose="02020603050405020304" pitchFamily="18" charset="0"/>
+                <a:cs typeface="Times New Roman" panose="02020603050405020304" pitchFamily="18" charset="0"/>
+              </a:rPr>
+              <a:t> </a:t>
+            </a:r>
+            <a:r>
+              <a:rPr lang="en-US" dirty="0" err="1" smtClean="0">
+                <a:latin typeface="Times New Roman" panose="02020603050405020304" pitchFamily="18" charset="0"/>
+                <a:cs typeface="Times New Roman" panose="02020603050405020304" pitchFamily="18" charset="0"/>
+              </a:rPr>
+              <a:t>Thuận</a:t>
+            </a:r>
+            <a:r>
+              <a:rPr lang="en-US" dirty="0" smtClean="0">
+                <a:latin typeface="Times New Roman" panose="02020603050405020304" pitchFamily="18" charset="0"/>
+                <a:cs typeface="Times New Roman" panose="02020603050405020304" pitchFamily="18" charset="0"/>
+              </a:rPr>
+              <a:t>)</a:t>
+            </a:r>
+            <a:r>
+              <a:rPr lang="en-US" dirty="0">
+                <a:latin typeface="Times New Roman" panose="02020603050405020304" pitchFamily="18" charset="0"/>
+                <a:cs typeface="Times New Roman" panose="02020603050405020304" pitchFamily="18" charset="0"/>
+              </a:rPr>
+              <a:t/>
+            </a:r>
+            <a:br>
+              <a:rPr lang="en-US" dirty="0">
+                <a:latin typeface="Times New Roman" panose="02020603050405020304" pitchFamily="18" charset="0"/>
+                <a:cs typeface="Times New Roman" panose="02020603050405020304" pitchFamily="18" charset="0"/>
+              </a:rPr>
+            </a:br>
+            <a:r>
+              <a:rPr lang="en-US" dirty="0" smtClean="0">
+                <a:latin typeface="Times New Roman" panose="02020603050405020304" pitchFamily="18" charset="0"/>
+                <a:cs typeface="Times New Roman" panose="02020603050405020304" pitchFamily="18" charset="0"/>
+              </a:rPr>
+              <a:t>|</a:t>
+            </a:r>
+            <a:r>
+              <a:rPr lang="en-US" dirty="0" err="1" smtClean="0">
+                <a:latin typeface="Times New Roman" panose="02020603050405020304" pitchFamily="18" charset="0"/>
+                <a:cs typeface="Times New Roman" panose="02020603050405020304" pitchFamily="18" charset="0"/>
+              </a:rPr>
+              <a:t>Võ</a:t>
+            </a:r>
+            <a:r>
+              <a:rPr lang="en-US" dirty="0" smtClean="0">
+                <a:latin typeface="Times New Roman" panose="02020603050405020304" pitchFamily="18" charset="0"/>
+                <a:cs typeface="Times New Roman" panose="02020603050405020304" pitchFamily="18" charset="0"/>
+              </a:rPr>
+              <a:t> </a:t>
+            </a:r>
+            <a:r>
+              <a:rPr lang="en-US" dirty="0">
+                <a:latin typeface="Times New Roman" panose="02020603050405020304" pitchFamily="18" charset="0"/>
+                <a:cs typeface="Times New Roman" panose="02020603050405020304" pitchFamily="18" charset="0"/>
+              </a:rPr>
+              <a:t>Minh </a:t>
+            </a:r>
+            <a:r>
+              <a:rPr lang="en-US" dirty="0" err="1">
+                <a:latin typeface="Times New Roman" panose="02020603050405020304" pitchFamily="18" charset="0"/>
+                <a:cs typeface="Times New Roman" panose="02020603050405020304" pitchFamily="18" charset="0"/>
+              </a:rPr>
+              <a:t>Tấn</a:t>
+            </a:r>
+            <a:r>
+              <a:rPr lang="en-US" dirty="0">
+                <a:latin typeface="Times New Roman" panose="02020603050405020304" pitchFamily="18" charset="0"/>
+                <a:cs typeface="Times New Roman" panose="02020603050405020304" pitchFamily="18" charset="0"/>
+              </a:rPr>
+              <a:t> </a:t>
+            </a:r>
+            <a:r>
+              <a:rPr lang="en-US" dirty="0" err="1" smtClean="0">
+                <a:latin typeface="Times New Roman" panose="02020603050405020304" pitchFamily="18" charset="0"/>
+                <a:cs typeface="Times New Roman" panose="02020603050405020304" pitchFamily="18" charset="0"/>
+              </a:rPr>
+              <a:t>Vũ</a:t>
+            </a:r>
+            <a:r>
+              <a:rPr lang="en-US" dirty="0" smtClean="0">
+                <a:latin typeface="Times New Roman" panose="02020603050405020304" pitchFamily="18" charset="0"/>
+                <a:cs typeface="Times New Roman" panose="02020603050405020304" pitchFamily="18" charset="0"/>
+              </a:rPr>
+              <a:t> (</a:t>
+            </a:r>
+            <a:r>
+              <a:rPr lang="en-US" dirty="0" err="1" smtClean="0">
+                <a:latin typeface="Times New Roman" panose="02020603050405020304" pitchFamily="18" charset="0"/>
+                <a:cs typeface="Times New Roman" panose="02020603050405020304" pitchFamily="18" charset="0"/>
+              </a:rPr>
+              <a:t>Học</a:t>
+            </a:r>
+            <a:r>
+              <a:rPr lang="en-US" dirty="0" smtClean="0">
+                <a:latin typeface="Times New Roman" panose="02020603050405020304" pitchFamily="18" charset="0"/>
+                <a:cs typeface="Times New Roman" panose="02020603050405020304" pitchFamily="18" charset="0"/>
+              </a:rPr>
+              <a:t> </a:t>
+            </a:r>
+            <a:r>
+              <a:rPr lang="en-US" dirty="0" err="1" smtClean="0">
+                <a:latin typeface="Times New Roman" panose="02020603050405020304" pitchFamily="18" charset="0"/>
+                <a:cs typeface="Times New Roman" panose="02020603050405020304" pitchFamily="18" charset="0"/>
+              </a:rPr>
+              <a:t>sinh</a:t>
+            </a:r>
+            <a:r>
+              <a:rPr lang="en-US" dirty="0" smtClean="0">
+                <a:latin typeface="Times New Roman" panose="02020603050405020304" pitchFamily="18" charset="0"/>
+                <a:cs typeface="Times New Roman" panose="02020603050405020304" pitchFamily="18" charset="0"/>
+              </a:rPr>
+              <a:t> </a:t>
+            </a:r>
+            <a:r>
+              <a:rPr lang="en-US" dirty="0" err="1" smtClean="0">
+                <a:latin typeface="Times New Roman" panose="02020603050405020304" pitchFamily="18" charset="0"/>
+                <a:cs typeface="Times New Roman" panose="02020603050405020304" pitchFamily="18" charset="0"/>
+              </a:rPr>
+              <a:t>vũ</a:t>
+            </a:r>
+            <a:r>
+              <a:rPr lang="en-US" dirty="0" smtClean="0">
+                <a:latin typeface="Times New Roman" panose="02020603050405020304" pitchFamily="18" charset="0"/>
+                <a:cs typeface="Times New Roman" panose="02020603050405020304" pitchFamily="18" charset="0"/>
+              </a:rPr>
+              <a:t>)</a:t>
+            </a:r>
+            <a:r>
+              <a:rPr lang="en-US" dirty="0">
+                <a:latin typeface="Times New Roman" panose="02020603050405020304" pitchFamily="18" charset="0"/>
+                <a:cs typeface="Times New Roman" panose="02020603050405020304" pitchFamily="18" charset="0"/>
+              </a:rPr>
+              <a:t/>
+            </a:r>
+            <a:br>
+              <a:rPr lang="en-US" dirty="0">
+                <a:latin typeface="Times New Roman" panose="02020603050405020304" pitchFamily="18" charset="0"/>
+                <a:cs typeface="Times New Roman" panose="02020603050405020304" pitchFamily="18" charset="0"/>
+              </a:rPr>
+            </a:br>
+            <a:r>
+              <a:rPr lang="en-US" dirty="0" err="1" smtClean="0">
+                <a:latin typeface="Times New Roman" panose="02020603050405020304" pitchFamily="18" charset="0"/>
+                <a:cs typeface="Times New Roman" panose="02020603050405020304" pitchFamily="18" charset="0"/>
+              </a:rPr>
+              <a:t>Nguyễn</a:t>
+            </a:r>
+            <a:r>
+              <a:rPr lang="en-US" dirty="0" smtClean="0">
+                <a:latin typeface="Times New Roman" panose="02020603050405020304" pitchFamily="18" charset="0"/>
+                <a:cs typeface="Times New Roman" panose="02020603050405020304" pitchFamily="18" charset="0"/>
+              </a:rPr>
+              <a:t> </a:t>
+            </a:r>
+            <a:r>
+              <a:rPr lang="en-US" dirty="0" err="1">
+                <a:latin typeface="Times New Roman" panose="02020603050405020304" pitchFamily="18" charset="0"/>
+                <a:cs typeface="Times New Roman" panose="02020603050405020304" pitchFamily="18" charset="0"/>
+              </a:rPr>
+              <a:t>Trung</a:t>
+            </a:r>
+            <a:r>
+              <a:rPr lang="en-US" dirty="0">
+                <a:latin typeface="Times New Roman" panose="02020603050405020304" pitchFamily="18" charset="0"/>
+                <a:cs typeface="Times New Roman" panose="02020603050405020304" pitchFamily="18" charset="0"/>
+              </a:rPr>
+              <a:t> </a:t>
+            </a:r>
+            <a:r>
+              <a:rPr lang="en-US" dirty="0" err="1" smtClean="0">
+                <a:latin typeface="Times New Roman" panose="02020603050405020304" pitchFamily="18" charset="0"/>
+                <a:cs typeface="Times New Roman" panose="02020603050405020304" pitchFamily="18" charset="0"/>
+              </a:rPr>
+              <a:t>Hiếu</a:t>
+            </a:r>
+            <a:r>
+              <a:rPr lang="en-US" dirty="0" smtClean="0">
+                <a:latin typeface="Times New Roman" panose="02020603050405020304" pitchFamily="18" charset="0"/>
+                <a:cs typeface="Times New Roman" panose="02020603050405020304" pitchFamily="18" charset="0"/>
+              </a:rPr>
+              <a:t> (</a:t>
+            </a:r>
+            <a:r>
+              <a:rPr lang="en-US" dirty="0" err="1" smtClean="0">
+                <a:latin typeface="Times New Roman" panose="02020603050405020304" pitchFamily="18" charset="0"/>
+                <a:cs typeface="Times New Roman" panose="02020603050405020304" pitchFamily="18" charset="0"/>
+              </a:rPr>
+              <a:t>Sinh</a:t>
+            </a:r>
+            <a:r>
+              <a:rPr lang="en-US" dirty="0" smtClean="0">
+                <a:latin typeface="Times New Roman" panose="02020603050405020304" pitchFamily="18" charset="0"/>
+                <a:cs typeface="Times New Roman" panose="02020603050405020304" pitchFamily="18" charset="0"/>
+              </a:rPr>
+              <a:t> </a:t>
+            </a:r>
+            <a:r>
+              <a:rPr lang="en-US" dirty="0" err="1" smtClean="0">
+                <a:latin typeface="Times New Roman" panose="02020603050405020304" pitchFamily="18" charset="0"/>
+                <a:cs typeface="Times New Roman" panose="02020603050405020304" pitchFamily="18" charset="0"/>
+              </a:rPr>
+              <a:t>viên</a:t>
+            </a:r>
+            <a:r>
+              <a:rPr lang="en-US" dirty="0" smtClean="0">
+                <a:latin typeface="Times New Roman" panose="02020603050405020304" pitchFamily="18" charset="0"/>
+                <a:cs typeface="Times New Roman" panose="02020603050405020304" pitchFamily="18" charset="0"/>
+              </a:rPr>
+              <a:t> </a:t>
+            </a:r>
+            <a:r>
+              <a:rPr lang="en-US" dirty="0" err="1" smtClean="0">
+                <a:latin typeface="Times New Roman" panose="02020603050405020304" pitchFamily="18" charset="0"/>
+                <a:cs typeface="Times New Roman" panose="02020603050405020304" pitchFamily="18" charset="0"/>
+              </a:rPr>
+              <a:t>Hiếu</a:t>
+            </a:r>
+            <a:r>
+              <a:rPr lang="en-US" dirty="0" smtClean="0">
+                <a:latin typeface="Times New Roman" panose="02020603050405020304" pitchFamily="18" charset="0"/>
+                <a:cs typeface="Times New Roman" panose="02020603050405020304" pitchFamily="18" charset="0"/>
+              </a:rPr>
+              <a:t>)</a:t>
+            </a:r>
+            <a:r>
+              <a:rPr lang="en-US" dirty="0">
+                <a:latin typeface="Times New Roman" panose="02020603050405020304" pitchFamily="18" charset="0"/>
+                <a:cs typeface="Times New Roman" panose="02020603050405020304" pitchFamily="18" charset="0"/>
+              </a:rPr>
+              <a:t/>
+            </a:r>
+            <a:br>
+              <a:rPr lang="en-US" dirty="0">
+                <a:latin typeface="Times New Roman" panose="02020603050405020304" pitchFamily="18" charset="0"/>
+                <a:cs typeface="Times New Roman" panose="02020603050405020304" pitchFamily="18" charset="0"/>
+              </a:rPr>
+            </a:br>
+            <a:r>
+              <a:rPr lang="en-US" dirty="0" err="1" smtClean="0">
+                <a:latin typeface="Times New Roman" panose="02020603050405020304" pitchFamily="18" charset="0"/>
+                <a:cs typeface="Times New Roman" panose="02020603050405020304" pitchFamily="18" charset="0"/>
+              </a:rPr>
+              <a:t>Phạm</a:t>
+            </a:r>
+            <a:r>
+              <a:rPr lang="en-US" dirty="0" smtClean="0">
+                <a:latin typeface="Times New Roman" panose="02020603050405020304" pitchFamily="18" charset="0"/>
+                <a:cs typeface="Times New Roman" panose="02020603050405020304" pitchFamily="18" charset="0"/>
+              </a:rPr>
+              <a:t> </a:t>
+            </a:r>
+            <a:r>
+              <a:rPr lang="en-US" dirty="0" err="1">
+                <a:latin typeface="Times New Roman" panose="02020603050405020304" pitchFamily="18" charset="0"/>
+                <a:cs typeface="Times New Roman" panose="02020603050405020304" pitchFamily="18" charset="0"/>
+              </a:rPr>
+              <a:t>Thái</a:t>
+            </a:r>
+            <a:r>
+              <a:rPr lang="en-US" dirty="0">
+                <a:latin typeface="Times New Roman" panose="02020603050405020304" pitchFamily="18" charset="0"/>
+                <a:cs typeface="Times New Roman" panose="02020603050405020304" pitchFamily="18" charset="0"/>
+              </a:rPr>
+              <a:t> </a:t>
+            </a:r>
+            <a:r>
+              <a:rPr lang="en-US" dirty="0" err="1" smtClean="0">
+                <a:latin typeface="Times New Roman" panose="02020603050405020304" pitchFamily="18" charset="0"/>
+                <a:cs typeface="Times New Roman" panose="02020603050405020304" pitchFamily="18" charset="0"/>
+              </a:rPr>
+              <a:t>Dương</a:t>
+            </a:r>
+            <a:r>
+              <a:rPr lang="en-US" dirty="0" smtClean="0">
+                <a:latin typeface="Times New Roman" panose="02020603050405020304" pitchFamily="18" charset="0"/>
+                <a:cs typeface="Times New Roman" panose="02020603050405020304" pitchFamily="18" charset="0"/>
+              </a:rPr>
+              <a:t> (</a:t>
+            </a:r>
+            <a:r>
+              <a:rPr lang="en-US" dirty="0" err="1" smtClean="0">
+                <a:latin typeface="Times New Roman" panose="02020603050405020304" pitchFamily="18" charset="0"/>
+                <a:cs typeface="Times New Roman" panose="02020603050405020304" pitchFamily="18" charset="0"/>
+              </a:rPr>
+              <a:t>Sếp</a:t>
+            </a:r>
+            <a:r>
+              <a:rPr lang="en-US" dirty="0" smtClean="0">
+                <a:latin typeface="Times New Roman" panose="02020603050405020304" pitchFamily="18" charset="0"/>
+                <a:cs typeface="Times New Roman" panose="02020603050405020304" pitchFamily="18" charset="0"/>
+              </a:rPr>
+              <a:t> </a:t>
+            </a:r>
+            <a:r>
+              <a:rPr lang="en-US" dirty="0" err="1" smtClean="0">
+                <a:latin typeface="Times New Roman" panose="02020603050405020304" pitchFamily="18" charset="0"/>
+                <a:cs typeface="Times New Roman" panose="02020603050405020304" pitchFamily="18" charset="0"/>
+              </a:rPr>
+              <a:t>Dương</a:t>
+            </a:r>
+            <a:r>
+              <a:rPr lang="en-US" dirty="0" smtClean="0">
+                <a:latin typeface="Times New Roman" panose="02020603050405020304" pitchFamily="18" charset="0"/>
+                <a:cs typeface="Times New Roman" panose="02020603050405020304" pitchFamily="18" charset="0"/>
+              </a:rPr>
+              <a:t>)</a:t>
+            </a:r>
+            <a:r>
+              <a:rPr lang="en-US" dirty="0">
+                <a:latin typeface="Times New Roman" panose="02020603050405020304" pitchFamily="18" charset="0"/>
+                <a:cs typeface="Times New Roman" panose="02020603050405020304" pitchFamily="18" charset="0"/>
+              </a:rPr>
+              <a:t/>
+            </a:r>
+            <a:br>
+              <a:rPr lang="en-US" dirty="0">
+                <a:latin typeface="Times New Roman" panose="02020603050405020304" pitchFamily="18" charset="0"/>
+                <a:cs typeface="Times New Roman" panose="02020603050405020304" pitchFamily="18" charset="0"/>
+              </a:rPr>
+            </a:br>
+            <a:r>
+              <a:rPr lang="en-US" dirty="0" err="1" smtClean="0">
+                <a:latin typeface="Times New Roman" panose="02020603050405020304" pitchFamily="18" charset="0"/>
+                <a:cs typeface="Times New Roman" panose="02020603050405020304" pitchFamily="18" charset="0"/>
+              </a:rPr>
+              <a:t>Đinh</a:t>
+            </a:r>
+            <a:r>
+              <a:rPr lang="en-US" dirty="0" smtClean="0">
+                <a:latin typeface="Times New Roman" panose="02020603050405020304" pitchFamily="18" charset="0"/>
+                <a:cs typeface="Times New Roman" panose="02020603050405020304" pitchFamily="18" charset="0"/>
+              </a:rPr>
+              <a:t> </a:t>
+            </a:r>
+            <a:r>
+              <a:rPr lang="en-US" dirty="0" err="1">
+                <a:latin typeface="Times New Roman" panose="02020603050405020304" pitchFamily="18" charset="0"/>
+                <a:cs typeface="Times New Roman" panose="02020603050405020304" pitchFamily="18" charset="0"/>
+              </a:rPr>
+              <a:t>Hưng</a:t>
+            </a:r>
+            <a:r>
+              <a:rPr lang="en-US" dirty="0">
+                <a:latin typeface="Times New Roman" panose="02020603050405020304" pitchFamily="18" charset="0"/>
+                <a:cs typeface="Times New Roman" panose="02020603050405020304" pitchFamily="18" charset="0"/>
+              </a:rPr>
+              <a:t> </a:t>
+            </a:r>
+            <a:r>
+              <a:rPr lang="en-US" dirty="0" err="1" smtClean="0">
+                <a:latin typeface="Times New Roman" panose="02020603050405020304" pitchFamily="18" charset="0"/>
+                <a:cs typeface="Times New Roman" panose="02020603050405020304" pitchFamily="18" charset="0"/>
+              </a:rPr>
+              <a:t>Thịnh</a:t>
+            </a:r>
+            <a:r>
+              <a:rPr lang="en-US" dirty="0" smtClean="0">
+                <a:latin typeface="Times New Roman" panose="02020603050405020304" pitchFamily="18" charset="0"/>
+                <a:cs typeface="Times New Roman" panose="02020603050405020304" pitchFamily="18" charset="0"/>
+              </a:rPr>
+              <a:t> (</a:t>
+            </a:r>
+            <a:r>
+              <a:rPr lang="en-US" dirty="0" err="1" smtClean="0">
+                <a:latin typeface="Times New Roman" panose="02020603050405020304" pitchFamily="18" charset="0"/>
+                <a:cs typeface="Times New Roman" panose="02020603050405020304" pitchFamily="18" charset="0"/>
+              </a:rPr>
+              <a:t>Học</a:t>
+            </a:r>
+            <a:r>
+              <a:rPr lang="en-US" dirty="0" smtClean="0">
+                <a:latin typeface="Times New Roman" panose="02020603050405020304" pitchFamily="18" charset="0"/>
+                <a:cs typeface="Times New Roman" panose="02020603050405020304" pitchFamily="18" charset="0"/>
+              </a:rPr>
+              <a:t> </a:t>
+            </a:r>
+            <a:r>
+              <a:rPr lang="en-US" dirty="0" err="1" smtClean="0">
+                <a:latin typeface="Times New Roman" panose="02020603050405020304" pitchFamily="18" charset="0"/>
+                <a:cs typeface="Times New Roman" panose="02020603050405020304" pitchFamily="18" charset="0"/>
+              </a:rPr>
+              <a:t>sinh</a:t>
+            </a:r>
+            <a:r>
+              <a:rPr lang="en-US" dirty="0" smtClean="0">
+                <a:latin typeface="Times New Roman" panose="02020603050405020304" pitchFamily="18" charset="0"/>
+                <a:cs typeface="Times New Roman" panose="02020603050405020304" pitchFamily="18" charset="0"/>
+              </a:rPr>
+              <a:t> </a:t>
+            </a:r>
+            <a:r>
+              <a:rPr lang="en-US" dirty="0" err="1" smtClean="0">
+                <a:latin typeface="Times New Roman" panose="02020603050405020304" pitchFamily="18" charset="0"/>
+                <a:cs typeface="Times New Roman" panose="02020603050405020304" pitchFamily="18" charset="0"/>
+              </a:rPr>
+              <a:t>Thịnh</a:t>
+            </a:r>
+            <a:r>
+              <a:rPr lang="en-US" dirty="0" smtClean="0">
+                <a:latin typeface="Times New Roman" panose="02020603050405020304" pitchFamily="18" charset="0"/>
+                <a:cs typeface="Times New Roman" panose="02020603050405020304" pitchFamily="18" charset="0"/>
+              </a:rPr>
+              <a:t>)</a:t>
+            </a:r>
+            <a:endParaRPr lang="en-US" dirty="0">
+              <a:latin typeface="Times New Roman" panose="02020603050405020304" pitchFamily="18" charset="0"/>
+              <a:cs typeface="Times New Roman" panose="02020603050405020304" pitchFamily="18" charset="0"/>
             </a:endParaRPr>
           </a:p>
         </p:txBody>
       </p:sp>
       <p:sp>
         <p:nvSpPr>
-          <p:cNvPr id="3" name="Footer Placeholder 2"/>
+          <p:cNvPr id="3" name="Title 2"/>
+          <p:cNvSpPr>
+            <a:spLocks noGrp="1"/>
+          </p:cNvSpPr>
+          <p:nvPr>
+            <p:ph type="title"/>
+          </p:nvPr>
+        </p:nvSpPr>
+        <p:spPr/>
+        <p:txBody>
+          <a:bodyPr/>
+          <a:lstStyle/>
+          <a:p>
+            <a:pPr algn="l"/>
+            <a:r>
+              <a:rPr lang="en-US" dirty="0" err="1" smtClean="0"/>
+              <a:t>Quá</a:t>
+            </a:r>
+            <a:r>
+              <a:rPr lang="en-US" dirty="0" smtClean="0"/>
+              <a:t> </a:t>
+            </a:r>
+            <a:r>
+              <a:rPr lang="en-US" dirty="0" err="1" smtClean="0"/>
+              <a:t>trình</a:t>
+            </a:r>
+            <a:r>
+              <a:rPr lang="en-US" dirty="0" smtClean="0"/>
+              <a:t> </a:t>
+            </a:r>
+            <a:r>
+              <a:rPr lang="en-US" dirty="0" err="1" smtClean="0"/>
+              <a:t>thực</a:t>
+            </a:r>
+            <a:r>
+              <a:rPr lang="en-US" dirty="0" smtClean="0"/>
+              <a:t> </a:t>
+            </a:r>
+            <a:r>
+              <a:rPr lang="en-US" dirty="0" err="1" smtClean="0"/>
+              <a:t>hiện</a:t>
+            </a:r>
+            <a:endParaRPr lang="en-US" dirty="0"/>
+          </a:p>
+        </p:txBody>
+      </p:sp>
+      <p:sp>
+        <p:nvSpPr>
+          <p:cNvPr id="4" name="Footer Placeholder 3"/>
           <p:cNvSpPr>
             <a:spLocks noGrp="1"/>
           </p:cNvSpPr>
@@ -16382,7 +17923,7 @@
       </p:sp>
       <p:sp>
         <p:nvSpPr>
-          <p:cNvPr id="4" name="Slide Number Placeholder 3"/>
+          <p:cNvPr id="5" name="Slide Number Placeholder 4"/>
           <p:cNvSpPr>
             <a:spLocks noGrp="1"/>
           </p:cNvSpPr>
@@ -16406,20 +17947,13 @@
     </p:spTree>
     <p:extLst>
       <p:ext uri="{BB962C8B-B14F-4D97-AF65-F5344CB8AC3E}">
-        <p14:creationId xmlns:p14="http://schemas.microsoft.com/office/powerpoint/2010/main" val="3501282844"/>
+        <p14:creationId xmlns:p14="http://schemas.microsoft.com/office/powerpoint/2010/main" val="4003173121"/>
       </p:ext>
     </p:extLst>
   </p:cSld>
   <p:clrMapOvr>
     <a:masterClrMapping/>
   </p:clrMapOvr>
-  <p:timing>
-    <p:tnLst>
-      <p:par>
-        <p:cTn id="1" dur="indefinite" restart="never" nodeType="tmRoot"/>
-      </p:par>
-    </p:tnLst>
-  </p:timing>
 </p:sld>
 </file>
 
@@ -16452,204 +17986,51 @@
         </p:nvSpPr>
         <p:spPr>
           <a:xfrm>
-            <a:off x="609601" y="1676400"/>
-            <a:ext cx="7670800" cy="4449763"/>
+            <a:off x="872067" y="533400"/>
+            <a:ext cx="7408333" cy="5592763"/>
           </a:xfrm>
         </p:spPr>
         <p:txBody>
           <a:bodyPr/>
           <a:lstStyle/>
           <a:p>
-            <a:pPr marL="0" indent="0">
-              <a:buNone/>
-            </a:pPr>
-            <a:r>
-              <a:rPr lang="en-US" sz="2000" b="1" dirty="0" err="1" smtClean="0">
+            <a:r>
+              <a:rPr lang="en-US" sz="2000" b="1" dirty="0" err="1">
                 <a:latin typeface="Times New Roman" pitchFamily="18" charset="0"/>
                 <a:cs typeface="Times New Roman" pitchFamily="18" charset="0"/>
               </a:rPr>
-              <a:t>Lên</a:t>
-            </a:r>
-            <a:r>
-              <a:rPr lang="en-US" sz="2000" b="1" dirty="0" smtClean="0">
+              <a:t>Hậu</a:t>
+            </a:r>
+            <a:r>
+              <a:rPr lang="en-US" sz="2000" b="1" dirty="0">
                 <a:latin typeface="Times New Roman" pitchFamily="18" charset="0"/>
                 <a:cs typeface="Times New Roman" pitchFamily="18" charset="0"/>
               </a:rPr>
               <a:t> </a:t>
             </a:r>
             <a:r>
-              <a:rPr lang="en-US" sz="2000" b="1" dirty="0" err="1" smtClean="0">
+              <a:rPr lang="en-US" sz="2000" b="1" dirty="0" err="1">
                 <a:latin typeface="Times New Roman" pitchFamily="18" charset="0"/>
                 <a:cs typeface="Times New Roman" pitchFamily="18" charset="0"/>
               </a:rPr>
-              <a:t>kế</a:t>
-            </a:r>
-            <a:r>
-              <a:rPr lang="en-US" sz="2000" b="1" dirty="0" smtClean="0">
+              <a:t>kì</a:t>
+            </a:r>
+            <a:r>
+              <a:rPr lang="en-US" sz="2000" b="1" dirty="0">
                 <a:latin typeface="Times New Roman" pitchFamily="18" charset="0"/>
                 <a:cs typeface="Times New Roman" pitchFamily="18" charset="0"/>
               </a:rPr>
-              <a:t> </a:t>
-            </a:r>
-            <a:r>
-              <a:rPr lang="en-US" sz="2000" b="1" dirty="0" err="1" smtClean="0">
-                <a:latin typeface="Times New Roman" pitchFamily="18" charset="0"/>
-                <a:cs typeface="Times New Roman" pitchFamily="18" charset="0"/>
-              </a:rPr>
-              <a:t>hoạch</a:t>
-            </a:r>
-            <a:r>
-              <a:rPr lang="en-US" sz="2000" b="1" dirty="0" smtClean="0">
-                <a:latin typeface="Times New Roman" pitchFamily="18" charset="0"/>
-                <a:cs typeface="Times New Roman" pitchFamily="18" charset="0"/>
-              </a:rPr>
               <a:t>:</a:t>
             </a:r>
           </a:p>
           <a:p>
-            <a:pPr marL="0" indent="0">
-              <a:buNone/>
-            </a:pPr>
-            <a:r>
-              <a:rPr lang="en-US" sz="2000" b="1" dirty="0" err="1" smtClean="0">
-                <a:latin typeface="Times New Roman" pitchFamily="18" charset="0"/>
-                <a:cs typeface="Times New Roman" pitchFamily="18" charset="0"/>
-              </a:rPr>
-              <a:t>Cảnh</a:t>
-            </a:r>
-            <a:r>
-              <a:rPr lang="en-US" sz="2000" b="1" dirty="0" smtClean="0">
-                <a:latin typeface="Times New Roman" pitchFamily="18" charset="0"/>
-                <a:cs typeface="Times New Roman" pitchFamily="18" charset="0"/>
-              </a:rPr>
-              <a:t> quay:</a:t>
-            </a:r>
-          </a:p>
-          <a:p>
-            <a:pPr marL="0" indent="0">
-              <a:buNone/>
-            </a:pPr>
-            <a:r>
-              <a:rPr lang="en-US" sz="2000" b="1" dirty="0" err="1" smtClean="0">
-                <a:latin typeface="Times New Roman" pitchFamily="18" charset="0"/>
-                <a:cs typeface="Times New Roman" pitchFamily="18" charset="0"/>
-              </a:rPr>
-              <a:t>Diễn</a:t>
-            </a:r>
-            <a:r>
-              <a:rPr lang="en-US" sz="2000" b="1" dirty="0" smtClean="0">
-                <a:latin typeface="Times New Roman" pitchFamily="18" charset="0"/>
-                <a:cs typeface="Times New Roman" pitchFamily="18" charset="0"/>
-              </a:rPr>
-              <a:t> </a:t>
-            </a:r>
-            <a:r>
-              <a:rPr lang="en-US" sz="2000" b="1" dirty="0" err="1" smtClean="0">
-                <a:latin typeface="Times New Roman" pitchFamily="18" charset="0"/>
-                <a:cs typeface="Times New Roman" pitchFamily="18" charset="0"/>
-              </a:rPr>
-              <a:t>viên</a:t>
-            </a:r>
-            <a:r>
-              <a:rPr lang="en-US" sz="2000" b="1" dirty="0" smtClean="0">
-                <a:latin typeface="Times New Roman" pitchFamily="18" charset="0"/>
-                <a:cs typeface="Times New Roman" pitchFamily="18" charset="0"/>
-              </a:rPr>
-              <a:t>:</a:t>
-            </a:r>
-          </a:p>
-          <a:p>
-            <a:pPr marL="0" indent="0">
-              <a:buNone/>
-            </a:pPr>
-            <a:r>
-              <a:rPr lang="en-US" sz="2000" b="1" dirty="0" err="1" smtClean="0">
-                <a:latin typeface="Times New Roman" pitchFamily="18" charset="0"/>
-                <a:cs typeface="Times New Roman" pitchFamily="18" charset="0"/>
-              </a:rPr>
-              <a:t>Phân</a:t>
-            </a:r>
-            <a:r>
-              <a:rPr lang="en-US" sz="2000" b="1" dirty="0" smtClean="0">
-                <a:latin typeface="Times New Roman" pitchFamily="18" charset="0"/>
-                <a:cs typeface="Times New Roman" pitchFamily="18" charset="0"/>
-              </a:rPr>
-              <a:t> </a:t>
-            </a:r>
-            <a:r>
-              <a:rPr lang="en-US" sz="2000" b="1" dirty="0" err="1" smtClean="0">
-                <a:latin typeface="Times New Roman" pitchFamily="18" charset="0"/>
-                <a:cs typeface="Times New Roman" pitchFamily="18" charset="0"/>
-              </a:rPr>
-              <a:t>vai</a:t>
-            </a:r>
-            <a:r>
-              <a:rPr lang="en-US" sz="2000" b="1" dirty="0" smtClean="0">
-                <a:latin typeface="Times New Roman" pitchFamily="18" charset="0"/>
-                <a:cs typeface="Times New Roman" pitchFamily="18" charset="0"/>
-              </a:rPr>
-              <a:t>:</a:t>
-            </a:r>
-          </a:p>
-          <a:p>
-            <a:pPr marL="0" indent="0">
-              <a:buNone/>
-            </a:pPr>
             <a:endParaRPr lang="en-US" dirty="0"/>
           </a:p>
         </p:txBody>
       </p:sp>
       <p:sp>
         <p:nvSpPr>
-          <p:cNvPr id="3" name="Title 2"/>
-          <p:cNvSpPr>
-            <a:spLocks noGrp="1"/>
-          </p:cNvSpPr>
-          <p:nvPr>
-            <p:ph type="title"/>
-          </p:nvPr>
-        </p:nvSpPr>
-        <p:spPr/>
-        <p:txBody>
-          <a:bodyPr/>
-          <a:lstStyle/>
-          <a:p>
-            <a:pPr algn="l"/>
-            <a:r>
-              <a:rPr lang="en-US" dirty="0" err="1" smtClean="0"/>
-              <a:t>Quá</a:t>
-            </a:r>
-            <a:r>
-              <a:rPr lang="en-US" dirty="0" smtClean="0"/>
-              <a:t> </a:t>
-            </a:r>
-            <a:r>
-              <a:rPr lang="en-US" dirty="0" err="1" smtClean="0"/>
-              <a:t>trình</a:t>
-            </a:r>
-            <a:r>
-              <a:rPr lang="en-US" dirty="0" smtClean="0"/>
-              <a:t> </a:t>
-            </a:r>
-            <a:r>
-              <a:rPr lang="en-US" dirty="0" err="1" smtClean="0"/>
-              <a:t>thực</a:t>
-            </a:r>
-            <a:r>
-              <a:rPr lang="en-US" dirty="0" smtClean="0"/>
-              <a:t> </a:t>
-            </a:r>
-            <a:r>
-              <a:rPr lang="en-US" dirty="0" err="1" smtClean="0"/>
-              <a:t>hiện</a:t>
-            </a:r>
-            <a:endParaRPr lang="en-US" dirty="0"/>
-          </a:p>
-        </p:txBody>
-      </p:sp>
-      <p:sp>
-        <p:nvSpPr>
-          <p:cNvPr id="4" name="Footer Placeholder 3"/>
+          <p:cNvPr id="3" name="Footer Placeholder 2"/>
           <p:cNvSpPr>
             <a:spLocks noGrp="1"/>
           </p:cNvSpPr>
@@ -16672,7 +18053,7 @@
       </p:sp>
       <p:sp>
         <p:nvSpPr>
-          <p:cNvPr id="5" name="Slide Number Placeholder 4"/>
+          <p:cNvPr id="4" name="Slide Number Placeholder 3"/>
           <p:cNvSpPr>
             <a:spLocks noGrp="1"/>
           </p:cNvSpPr>
@@ -16696,13 +18077,20 @@
     </p:spTree>
     <p:extLst>
       <p:ext uri="{BB962C8B-B14F-4D97-AF65-F5344CB8AC3E}">
-        <p14:creationId xmlns:p14="http://schemas.microsoft.com/office/powerpoint/2010/main" val="4003173121"/>
+        <p14:creationId xmlns:p14="http://schemas.microsoft.com/office/powerpoint/2010/main" val="2273455860"/>
       </p:ext>
     </p:extLst>
   </p:cSld>
   <p:clrMapOvr>
     <a:masterClrMapping/>
   </p:clrMapOvr>
+  <p:timing>
+    <p:tnLst>
+      <p:par>
+        <p:cTn id="1" dur="indefinite" restart="never" nodeType="tmRoot"/>
+      </p:par>
+    </p:tnLst>
+  </p:timing>
 </p:sld>
 </file>
 

</xml_diff>